<commit_message>
Fixed presentation based on notes from Idit
</commit_message>
<xml_diff>
--- a/files/PODC19-BA-Sketches.pptx
+++ b/files/PODC19-BA-Sketches.pptx
@@ -2,7 +2,7 @@
 <file path=ppt/presentation.xml><?xml version="1.0" encoding="utf-8"?>
 <p:presentation xmlns:a="http://schemas.openxmlformats.org/drawingml/2006/main" xmlns:r="http://schemas.openxmlformats.org/officeDocument/2006/relationships" xmlns:p="http://schemas.openxmlformats.org/presentationml/2006/main" saveSubsetFonts="1">
   <p:sldMasterIdLst>
-    <p:sldMasterId id="2147483648" r:id="rId1"/>
+    <p:sldMasterId id="2147483660" r:id="rId1"/>
   </p:sldMasterIdLst>
   <p:notesMasterIdLst>
     <p:notesMasterId r:id="rId15"/>
@@ -22,7 +22,7 @@
     <p:sldId id="618" r:id="rId13"/>
     <p:sldId id="619" r:id="rId14"/>
   </p:sldIdLst>
-  <p:sldSz cx="12192000" cy="6858000"/>
+  <p:sldSz cx="9144000" cy="6858000" type="screen4x3"/>
   <p:notesSz cx="6858000" cy="9144000"/>
   <p:defaultTextStyle>
     <a:defPPr>
@@ -462,7 +462,7 @@
           <a:p>
             <a:fld id="{FD112ADC-9D5C-452C-AF74-CDF2E8E1D801}" type="datetimeFigureOut">
               <a:rPr lang="en-US" smtClean="0"/>
-              <a:t>7/2/2019</a:t>
+              <a:t>7/15/2019</a:t>
             </a:fld>
             <a:endParaRPr lang="en-US"/>
           </a:p>
@@ -480,8 +480,8 @@
         </p:nvSpPr>
         <p:spPr>
           <a:xfrm>
-            <a:off x="685800" y="1143000"/>
-            <a:ext cx="5486400" cy="3086100"/>
+            <a:off x="1371600" y="1143000"/>
+            <a:ext cx="4114800" cy="3086100"/>
           </a:xfrm>
           <a:prstGeom prst="rect">
             <a:avLst/>
@@ -756,7 +756,12 @@
             <p:ph type="sldImg"/>
           </p:nvPr>
         </p:nvSpPr>
-        <p:spPr/>
+        <p:spPr>
+          <a:xfrm>
+            <a:off x="1371600" y="1143000"/>
+            <a:ext cx="4114800" cy="3086100"/>
+          </a:xfrm>
+        </p:spPr>
       </p:sp>
       <p:sp>
         <p:nvSpPr>
@@ -840,7 +845,12 @@
             <p:ph type="sldImg"/>
           </p:nvPr>
         </p:nvSpPr>
-        <p:spPr/>
+        <p:spPr>
+          <a:xfrm>
+            <a:off x="1371600" y="1143000"/>
+            <a:ext cx="4114800" cy="3086100"/>
+          </a:xfrm>
+        </p:spPr>
       </p:sp>
       <p:sp>
         <p:nvSpPr>
@@ -924,7 +934,12 @@
             <p:ph type="sldImg"/>
           </p:nvPr>
         </p:nvSpPr>
-        <p:spPr/>
+        <p:spPr>
+          <a:xfrm>
+            <a:off x="1371600" y="1143000"/>
+            <a:ext cx="4114800" cy="3086100"/>
+          </a:xfrm>
+        </p:spPr>
       </p:sp>
       <p:sp>
         <p:nvSpPr>
@@ -1008,7 +1023,12 @@
             <p:ph type="sldImg"/>
           </p:nvPr>
         </p:nvSpPr>
-        <p:spPr/>
+        <p:spPr>
+          <a:xfrm>
+            <a:off x="1371600" y="1143000"/>
+            <a:ext cx="4114800" cy="3086100"/>
+          </a:xfrm>
+        </p:spPr>
       </p:sp>
       <p:sp>
         <p:nvSpPr>
@@ -1092,13 +1112,7 @@
       </p:grpSpPr>
       <p:sp>
         <p:nvSpPr>
-          <p:cNvPr id="2" name="Title 1">
-            <a:extLst>
-              <a:ext uri="{FF2B5EF4-FFF2-40B4-BE49-F238E27FC236}">
-                <a16:creationId xmlns:a16="http://schemas.microsoft.com/office/drawing/2014/main" id="{794B24BB-9929-4A31-8B24-2CC3F036771E}"/>
-              </a:ext>
-            </a:extLst>
-          </p:cNvPr>
+          <p:cNvPr id="2" name="Title 1"/>
           <p:cNvSpPr>
             <a:spLocks noGrp="1"/>
           </p:cNvSpPr>
@@ -1108,8 +1122,8 @@
         </p:nvSpPr>
         <p:spPr>
           <a:xfrm>
-            <a:off x="1524000" y="1122363"/>
-            <a:ext cx="9144000" cy="2387600"/>
+            <a:off x="685800" y="1122363"/>
+            <a:ext cx="7772400" cy="2387600"/>
           </a:xfrm>
         </p:spPr>
         <p:txBody>
@@ -1121,21 +1135,16 @@
           </a:lstStyle>
           <a:p>
             <a:r>
-              <a:rPr lang="en-US"/>
+              <a:rPr lang="en-US" smtClean="0"/>
               <a:t>Click to edit Master title style</a:t>
             </a:r>
-          </a:p>
-        </p:txBody>
-      </p:sp>
-      <p:sp>
-        <p:nvSpPr>
-          <p:cNvPr id="3" name="Subtitle 2">
-            <a:extLst>
-              <a:ext uri="{FF2B5EF4-FFF2-40B4-BE49-F238E27FC236}">
-                <a16:creationId xmlns:a16="http://schemas.microsoft.com/office/drawing/2014/main" id="{20E960C2-026B-40EA-9A31-5FBD4E89F4B1}"/>
-              </a:ext>
-            </a:extLst>
-          </p:cNvPr>
+            <a:endParaRPr lang="en-US" dirty="0"/>
+          </a:p>
+        </p:txBody>
+      </p:sp>
+      <p:sp>
+        <p:nvSpPr>
+          <p:cNvPr id="3" name="Subtitle 2"/>
           <p:cNvSpPr>
             <a:spLocks noGrp="1"/>
           </p:cNvSpPr>
@@ -1145,8 +1154,8 @@
         </p:nvSpPr>
         <p:spPr>
           <a:xfrm>
-            <a:off x="1524000" y="3602038"/>
-            <a:ext cx="9144000" cy="1655762"/>
+            <a:off x="1143000" y="3602038"/>
+            <a:ext cx="6858000" cy="1655762"/>
           </a:xfrm>
         </p:spPr>
         <p:txBody>
@@ -1191,21 +1200,16 @@
           </a:lstStyle>
           <a:p>
             <a:r>
-              <a:rPr lang="en-US"/>
+              <a:rPr lang="en-US" smtClean="0"/>
               <a:t>Click to edit Master subtitle style</a:t>
             </a:r>
-          </a:p>
-        </p:txBody>
-      </p:sp>
-      <p:sp>
-        <p:nvSpPr>
-          <p:cNvPr id="4" name="Date Placeholder 3">
-            <a:extLst>
-              <a:ext uri="{FF2B5EF4-FFF2-40B4-BE49-F238E27FC236}">
-                <a16:creationId xmlns:a16="http://schemas.microsoft.com/office/drawing/2014/main" id="{4E5B7BBD-AD22-45ED-8C58-46556FEC5318}"/>
-              </a:ext>
-            </a:extLst>
-          </p:cNvPr>
+            <a:endParaRPr lang="en-US" dirty="0"/>
+          </a:p>
+        </p:txBody>
+      </p:sp>
+      <p:sp>
+        <p:nvSpPr>
+          <p:cNvPr id="4" name="Date Placeholder 3"/>
           <p:cNvSpPr>
             <a:spLocks noGrp="1"/>
           </p:cNvSpPr>
@@ -1220,7 +1224,7 @@
           <a:p>
             <a:fld id="{CE003715-055B-4567-A5EE-A0CFAD250621}" type="datetimeFigureOut">
               <a:rPr lang="en-US" smtClean="0"/>
-              <a:t>7/2/2019</a:t>
+              <a:t>7/15/2019</a:t>
             </a:fld>
             <a:endParaRPr lang="en-US"/>
           </a:p>
@@ -1228,13 +1232,7 @@
       </p:sp>
       <p:sp>
         <p:nvSpPr>
-          <p:cNvPr id="5" name="Footer Placeholder 4">
-            <a:extLst>
-              <a:ext uri="{FF2B5EF4-FFF2-40B4-BE49-F238E27FC236}">
-                <a16:creationId xmlns:a16="http://schemas.microsoft.com/office/drawing/2014/main" id="{69A4133D-F0A8-47FC-8613-EB05857E8E98}"/>
-              </a:ext>
-            </a:extLst>
-          </p:cNvPr>
+          <p:cNvPr id="5" name="Footer Placeholder 4"/>
           <p:cNvSpPr>
             <a:spLocks noGrp="1"/>
           </p:cNvSpPr>
@@ -1253,13 +1251,7 @@
       </p:sp>
       <p:sp>
         <p:nvSpPr>
-          <p:cNvPr id="6" name="Slide Number Placeholder 5">
-            <a:extLst>
-              <a:ext uri="{FF2B5EF4-FFF2-40B4-BE49-F238E27FC236}">
-                <a16:creationId xmlns:a16="http://schemas.microsoft.com/office/drawing/2014/main" id="{878CDA62-9B0E-4E06-B768-76457A500AFB}"/>
-              </a:ext>
-            </a:extLst>
-          </p:cNvPr>
+          <p:cNvPr id="6" name="Slide Number Placeholder 5"/>
           <p:cNvSpPr>
             <a:spLocks noGrp="1"/>
           </p:cNvSpPr>
@@ -1283,7 +1275,7 @@
     </p:spTree>
     <p:extLst>
       <p:ext uri="{BB962C8B-B14F-4D97-AF65-F5344CB8AC3E}">
-        <p14:creationId xmlns:p14="http://schemas.microsoft.com/office/powerpoint/2010/main" val="3066323865"/>
+        <p14:creationId xmlns:p14="http://schemas.microsoft.com/office/powerpoint/2010/main" val="1152930379"/>
       </p:ext>
     </p:extLst>
   </p:cSld>
@@ -1312,13 +1304,7 @@
       </p:grpSpPr>
       <p:sp>
         <p:nvSpPr>
-          <p:cNvPr id="2" name="Title 1">
-            <a:extLst>
-              <a:ext uri="{FF2B5EF4-FFF2-40B4-BE49-F238E27FC236}">
-                <a16:creationId xmlns:a16="http://schemas.microsoft.com/office/drawing/2014/main" id="{4D767C66-0CE1-4F72-A33C-1EA3F4FEA6C5}"/>
-              </a:ext>
-            </a:extLst>
-          </p:cNvPr>
+          <p:cNvPr id="2" name="Title 1"/>
           <p:cNvSpPr>
             <a:spLocks noGrp="1"/>
           </p:cNvSpPr>
@@ -1332,21 +1318,16 @@
           <a:lstStyle/>
           <a:p>
             <a:r>
-              <a:rPr lang="en-US"/>
+              <a:rPr lang="en-US" smtClean="0"/>
               <a:t>Click to edit Master title style</a:t>
             </a:r>
-          </a:p>
-        </p:txBody>
-      </p:sp>
-      <p:sp>
-        <p:nvSpPr>
-          <p:cNvPr id="3" name="Vertical Text Placeholder 2">
-            <a:extLst>
-              <a:ext uri="{FF2B5EF4-FFF2-40B4-BE49-F238E27FC236}">
-                <a16:creationId xmlns:a16="http://schemas.microsoft.com/office/drawing/2014/main" id="{956CC23E-613A-41D4-92BB-9BF1E0BF8D69}"/>
-              </a:ext>
-            </a:extLst>
-          </p:cNvPr>
+            <a:endParaRPr lang="en-US" dirty="0"/>
+          </a:p>
+        </p:txBody>
+      </p:sp>
+      <p:sp>
+        <p:nvSpPr>
+          <p:cNvPr id="3" name="Vertical Text Placeholder 2"/>
           <p:cNvSpPr>
             <a:spLocks noGrp="1"/>
           </p:cNvSpPr>
@@ -1361,49 +1342,44 @@
           <a:p>
             <a:pPr lvl="0"/>
             <a:r>
-              <a:rPr lang="en-US"/>
-              <a:t>Click to edit Master text styles</a:t>
+              <a:rPr lang="en-US" smtClean="0"/>
+              <a:t>Edit Master text styles</a:t>
             </a:r>
           </a:p>
           <a:p>
             <a:pPr lvl="1"/>
             <a:r>
-              <a:rPr lang="en-US"/>
+              <a:rPr lang="en-US" smtClean="0"/>
               <a:t>Second level</a:t>
             </a:r>
           </a:p>
           <a:p>
             <a:pPr lvl="2"/>
             <a:r>
-              <a:rPr lang="en-US"/>
+              <a:rPr lang="en-US" smtClean="0"/>
               <a:t>Third level</a:t>
             </a:r>
           </a:p>
           <a:p>
             <a:pPr lvl="3"/>
             <a:r>
-              <a:rPr lang="en-US"/>
+              <a:rPr lang="en-US" smtClean="0"/>
               <a:t>Fourth level</a:t>
             </a:r>
           </a:p>
           <a:p>
             <a:pPr lvl="4"/>
             <a:r>
-              <a:rPr lang="en-US"/>
+              <a:rPr lang="en-US" smtClean="0"/>
               <a:t>Fifth level</a:t>
             </a:r>
-          </a:p>
-        </p:txBody>
-      </p:sp>
-      <p:sp>
-        <p:nvSpPr>
-          <p:cNvPr id="4" name="Date Placeholder 3">
-            <a:extLst>
-              <a:ext uri="{FF2B5EF4-FFF2-40B4-BE49-F238E27FC236}">
-                <a16:creationId xmlns:a16="http://schemas.microsoft.com/office/drawing/2014/main" id="{B414B51E-8356-40E8-AC6A-237F36C81B4C}"/>
-              </a:ext>
-            </a:extLst>
-          </p:cNvPr>
+            <a:endParaRPr lang="en-US" dirty="0"/>
+          </a:p>
+        </p:txBody>
+      </p:sp>
+      <p:sp>
+        <p:nvSpPr>
+          <p:cNvPr id="4" name="Date Placeholder 3"/>
           <p:cNvSpPr>
             <a:spLocks noGrp="1"/>
           </p:cNvSpPr>
@@ -1418,7 +1394,7 @@
           <a:p>
             <a:fld id="{CE003715-055B-4567-A5EE-A0CFAD250621}" type="datetimeFigureOut">
               <a:rPr lang="en-US" smtClean="0"/>
-              <a:t>7/2/2019</a:t>
+              <a:t>7/15/2019</a:t>
             </a:fld>
             <a:endParaRPr lang="en-US"/>
           </a:p>
@@ -1426,13 +1402,7 @@
       </p:sp>
       <p:sp>
         <p:nvSpPr>
-          <p:cNvPr id="5" name="Footer Placeholder 4">
-            <a:extLst>
-              <a:ext uri="{FF2B5EF4-FFF2-40B4-BE49-F238E27FC236}">
-                <a16:creationId xmlns:a16="http://schemas.microsoft.com/office/drawing/2014/main" id="{698B640F-701F-4F4A-B9B2-86F06EBB962B}"/>
-              </a:ext>
-            </a:extLst>
-          </p:cNvPr>
+          <p:cNvPr id="5" name="Footer Placeholder 4"/>
           <p:cNvSpPr>
             <a:spLocks noGrp="1"/>
           </p:cNvSpPr>
@@ -1451,13 +1421,7 @@
       </p:sp>
       <p:sp>
         <p:nvSpPr>
-          <p:cNvPr id="6" name="Slide Number Placeholder 5">
-            <a:extLst>
-              <a:ext uri="{FF2B5EF4-FFF2-40B4-BE49-F238E27FC236}">
-                <a16:creationId xmlns:a16="http://schemas.microsoft.com/office/drawing/2014/main" id="{AFF16010-A848-4124-BBDF-D42C54DAB5E9}"/>
-              </a:ext>
-            </a:extLst>
-          </p:cNvPr>
+          <p:cNvPr id="6" name="Slide Number Placeholder 5"/>
           <p:cNvSpPr>
             <a:spLocks noGrp="1"/>
           </p:cNvSpPr>
@@ -1481,7 +1445,7 @@
     </p:spTree>
     <p:extLst>
       <p:ext uri="{BB962C8B-B14F-4D97-AF65-F5344CB8AC3E}">
-        <p14:creationId xmlns:p14="http://schemas.microsoft.com/office/powerpoint/2010/main" val="2314397122"/>
+        <p14:creationId xmlns:p14="http://schemas.microsoft.com/office/powerpoint/2010/main" val="4143012684"/>
       </p:ext>
     </p:extLst>
   </p:cSld>
@@ -1510,13 +1474,7 @@
       </p:grpSpPr>
       <p:sp>
         <p:nvSpPr>
-          <p:cNvPr id="2" name="Vertical Title 1">
-            <a:extLst>
-              <a:ext uri="{FF2B5EF4-FFF2-40B4-BE49-F238E27FC236}">
-                <a16:creationId xmlns:a16="http://schemas.microsoft.com/office/drawing/2014/main" id="{D9645F0C-A1F0-4384-B9DF-DD3307F6FBE3}"/>
-              </a:ext>
-            </a:extLst>
-          </p:cNvPr>
+          <p:cNvPr id="2" name="Vertical Title 1"/>
           <p:cNvSpPr>
             <a:spLocks noGrp="1"/>
           </p:cNvSpPr>
@@ -1526,8 +1484,8 @@
         </p:nvSpPr>
         <p:spPr>
           <a:xfrm>
-            <a:off x="8724900" y="365125"/>
-            <a:ext cx="2628900" cy="5811838"/>
+            <a:off x="6543675" y="365125"/>
+            <a:ext cx="1971675" cy="5811838"/>
           </a:xfrm>
         </p:spPr>
         <p:txBody>
@@ -1535,21 +1493,16 @@
           <a:lstStyle/>
           <a:p>
             <a:r>
-              <a:rPr lang="en-US"/>
+              <a:rPr lang="en-US" smtClean="0"/>
               <a:t>Click to edit Master title style</a:t>
             </a:r>
-          </a:p>
-        </p:txBody>
-      </p:sp>
-      <p:sp>
-        <p:nvSpPr>
-          <p:cNvPr id="3" name="Vertical Text Placeholder 2">
-            <a:extLst>
-              <a:ext uri="{FF2B5EF4-FFF2-40B4-BE49-F238E27FC236}">
-                <a16:creationId xmlns:a16="http://schemas.microsoft.com/office/drawing/2014/main" id="{01EA5532-11EC-40E1-BDA2-A2C0B00A492E}"/>
-              </a:ext>
-            </a:extLst>
-          </p:cNvPr>
+            <a:endParaRPr lang="en-US" dirty="0"/>
+          </a:p>
+        </p:txBody>
+      </p:sp>
+      <p:sp>
+        <p:nvSpPr>
+          <p:cNvPr id="3" name="Vertical Text Placeholder 2"/>
           <p:cNvSpPr>
             <a:spLocks noGrp="1"/>
           </p:cNvSpPr>
@@ -1559,8 +1512,8 @@
         </p:nvSpPr>
         <p:spPr>
           <a:xfrm>
-            <a:off x="838200" y="365125"/>
-            <a:ext cx="7734300" cy="5811838"/>
+            <a:off x="628650" y="365125"/>
+            <a:ext cx="5800725" cy="5811838"/>
           </a:xfrm>
         </p:spPr>
         <p:txBody>
@@ -1569,49 +1522,44 @@
           <a:p>
             <a:pPr lvl="0"/>
             <a:r>
-              <a:rPr lang="en-US"/>
-              <a:t>Click to edit Master text styles</a:t>
+              <a:rPr lang="en-US" smtClean="0"/>
+              <a:t>Edit Master text styles</a:t>
             </a:r>
           </a:p>
           <a:p>
             <a:pPr lvl="1"/>
             <a:r>
-              <a:rPr lang="en-US"/>
+              <a:rPr lang="en-US" smtClean="0"/>
               <a:t>Second level</a:t>
             </a:r>
           </a:p>
           <a:p>
             <a:pPr lvl="2"/>
             <a:r>
-              <a:rPr lang="en-US"/>
+              <a:rPr lang="en-US" smtClean="0"/>
               <a:t>Third level</a:t>
             </a:r>
           </a:p>
           <a:p>
             <a:pPr lvl="3"/>
             <a:r>
-              <a:rPr lang="en-US"/>
+              <a:rPr lang="en-US" smtClean="0"/>
               <a:t>Fourth level</a:t>
             </a:r>
           </a:p>
           <a:p>
             <a:pPr lvl="4"/>
             <a:r>
-              <a:rPr lang="en-US"/>
+              <a:rPr lang="en-US" smtClean="0"/>
               <a:t>Fifth level</a:t>
             </a:r>
-          </a:p>
-        </p:txBody>
-      </p:sp>
-      <p:sp>
-        <p:nvSpPr>
-          <p:cNvPr id="4" name="Date Placeholder 3">
-            <a:extLst>
-              <a:ext uri="{FF2B5EF4-FFF2-40B4-BE49-F238E27FC236}">
-                <a16:creationId xmlns:a16="http://schemas.microsoft.com/office/drawing/2014/main" id="{6979EBEF-4653-4C40-8357-B734F167D502}"/>
-              </a:ext>
-            </a:extLst>
-          </p:cNvPr>
+            <a:endParaRPr lang="en-US" dirty="0"/>
+          </a:p>
+        </p:txBody>
+      </p:sp>
+      <p:sp>
+        <p:nvSpPr>
+          <p:cNvPr id="4" name="Date Placeholder 3"/>
           <p:cNvSpPr>
             <a:spLocks noGrp="1"/>
           </p:cNvSpPr>
@@ -1626,7 +1574,7 @@
           <a:p>
             <a:fld id="{CE003715-055B-4567-A5EE-A0CFAD250621}" type="datetimeFigureOut">
               <a:rPr lang="en-US" smtClean="0"/>
-              <a:t>7/2/2019</a:t>
+              <a:t>7/15/2019</a:t>
             </a:fld>
             <a:endParaRPr lang="en-US"/>
           </a:p>
@@ -1634,13 +1582,7 @@
       </p:sp>
       <p:sp>
         <p:nvSpPr>
-          <p:cNvPr id="5" name="Footer Placeholder 4">
-            <a:extLst>
-              <a:ext uri="{FF2B5EF4-FFF2-40B4-BE49-F238E27FC236}">
-                <a16:creationId xmlns:a16="http://schemas.microsoft.com/office/drawing/2014/main" id="{B3F09E8E-13AC-4C53-A212-31EB212A6083}"/>
-              </a:ext>
-            </a:extLst>
-          </p:cNvPr>
+          <p:cNvPr id="5" name="Footer Placeholder 4"/>
           <p:cNvSpPr>
             <a:spLocks noGrp="1"/>
           </p:cNvSpPr>
@@ -1659,13 +1601,7 @@
       </p:sp>
       <p:sp>
         <p:nvSpPr>
-          <p:cNvPr id="6" name="Slide Number Placeholder 5">
-            <a:extLst>
-              <a:ext uri="{FF2B5EF4-FFF2-40B4-BE49-F238E27FC236}">
-                <a16:creationId xmlns:a16="http://schemas.microsoft.com/office/drawing/2014/main" id="{EBEECE57-1CD7-47A6-91C5-EF02EDE6C8E3}"/>
-              </a:ext>
-            </a:extLst>
-          </p:cNvPr>
+          <p:cNvPr id="6" name="Slide Number Placeholder 5"/>
           <p:cNvSpPr>
             <a:spLocks noGrp="1"/>
           </p:cNvSpPr>
@@ -1689,7 +1625,7 @@
     </p:spTree>
     <p:extLst>
       <p:ext uri="{BB962C8B-B14F-4D97-AF65-F5344CB8AC3E}">
-        <p14:creationId xmlns:p14="http://schemas.microsoft.com/office/powerpoint/2010/main" val="1964157080"/>
+        <p14:creationId xmlns:p14="http://schemas.microsoft.com/office/powerpoint/2010/main" val="18274977"/>
       </p:ext>
     </p:extLst>
   </p:cSld>
@@ -1718,13 +1654,7 @@
       </p:grpSpPr>
       <p:sp>
         <p:nvSpPr>
-          <p:cNvPr id="2" name="Title 1">
-            <a:extLst>
-              <a:ext uri="{FF2B5EF4-FFF2-40B4-BE49-F238E27FC236}">
-                <a16:creationId xmlns:a16="http://schemas.microsoft.com/office/drawing/2014/main" id="{3D9E6643-9FA2-4433-99F2-B9A772901747}"/>
-              </a:ext>
-            </a:extLst>
-          </p:cNvPr>
+          <p:cNvPr id="2" name="Title 1"/>
           <p:cNvSpPr>
             <a:spLocks noGrp="1"/>
           </p:cNvSpPr>
@@ -1738,21 +1668,16 @@
           <a:lstStyle/>
           <a:p>
             <a:r>
-              <a:rPr lang="en-US"/>
+              <a:rPr lang="en-US" smtClean="0"/>
               <a:t>Click to edit Master title style</a:t>
             </a:r>
-          </a:p>
-        </p:txBody>
-      </p:sp>
-      <p:sp>
-        <p:nvSpPr>
-          <p:cNvPr id="3" name="Content Placeholder 2">
-            <a:extLst>
-              <a:ext uri="{FF2B5EF4-FFF2-40B4-BE49-F238E27FC236}">
-                <a16:creationId xmlns:a16="http://schemas.microsoft.com/office/drawing/2014/main" id="{238507D8-924A-4A89-BD57-51142F6A41C9}"/>
-              </a:ext>
-            </a:extLst>
-          </p:cNvPr>
+            <a:endParaRPr lang="en-US" dirty="0"/>
+          </a:p>
+        </p:txBody>
+      </p:sp>
+      <p:sp>
+        <p:nvSpPr>
+          <p:cNvPr id="3" name="Content Placeholder 2"/>
           <p:cNvSpPr>
             <a:spLocks noGrp="1"/>
           </p:cNvSpPr>
@@ -1767,49 +1692,44 @@
           <a:p>
             <a:pPr lvl="0"/>
             <a:r>
-              <a:rPr lang="en-US"/>
-              <a:t>Click to edit Master text styles</a:t>
+              <a:rPr lang="en-US" smtClean="0"/>
+              <a:t>Edit Master text styles</a:t>
             </a:r>
           </a:p>
           <a:p>
             <a:pPr lvl="1"/>
             <a:r>
-              <a:rPr lang="en-US"/>
+              <a:rPr lang="en-US" smtClean="0"/>
               <a:t>Second level</a:t>
             </a:r>
           </a:p>
           <a:p>
             <a:pPr lvl="2"/>
             <a:r>
-              <a:rPr lang="en-US"/>
+              <a:rPr lang="en-US" smtClean="0"/>
               <a:t>Third level</a:t>
             </a:r>
           </a:p>
           <a:p>
             <a:pPr lvl="3"/>
             <a:r>
-              <a:rPr lang="en-US"/>
+              <a:rPr lang="en-US" smtClean="0"/>
               <a:t>Fourth level</a:t>
             </a:r>
           </a:p>
           <a:p>
             <a:pPr lvl="4"/>
             <a:r>
-              <a:rPr lang="en-US"/>
+              <a:rPr lang="en-US" smtClean="0"/>
               <a:t>Fifth level</a:t>
             </a:r>
-          </a:p>
-        </p:txBody>
-      </p:sp>
-      <p:sp>
-        <p:nvSpPr>
-          <p:cNvPr id="4" name="Date Placeholder 3">
-            <a:extLst>
-              <a:ext uri="{FF2B5EF4-FFF2-40B4-BE49-F238E27FC236}">
-                <a16:creationId xmlns:a16="http://schemas.microsoft.com/office/drawing/2014/main" id="{952A5AAF-B928-423D-B215-29FC15396424}"/>
-              </a:ext>
-            </a:extLst>
-          </p:cNvPr>
+            <a:endParaRPr lang="en-US" dirty="0"/>
+          </a:p>
+        </p:txBody>
+      </p:sp>
+      <p:sp>
+        <p:nvSpPr>
+          <p:cNvPr id="4" name="Date Placeholder 3"/>
           <p:cNvSpPr>
             <a:spLocks noGrp="1"/>
           </p:cNvSpPr>
@@ -1824,7 +1744,7 @@
           <a:p>
             <a:fld id="{CE003715-055B-4567-A5EE-A0CFAD250621}" type="datetimeFigureOut">
               <a:rPr lang="en-US" smtClean="0"/>
-              <a:t>7/2/2019</a:t>
+              <a:t>7/15/2019</a:t>
             </a:fld>
             <a:endParaRPr lang="en-US"/>
           </a:p>
@@ -1832,13 +1752,7 @@
       </p:sp>
       <p:sp>
         <p:nvSpPr>
-          <p:cNvPr id="5" name="Footer Placeholder 4">
-            <a:extLst>
-              <a:ext uri="{FF2B5EF4-FFF2-40B4-BE49-F238E27FC236}">
-                <a16:creationId xmlns:a16="http://schemas.microsoft.com/office/drawing/2014/main" id="{05093396-B805-46C9-BBB3-68DD71CAD059}"/>
-              </a:ext>
-            </a:extLst>
-          </p:cNvPr>
+          <p:cNvPr id="5" name="Footer Placeholder 4"/>
           <p:cNvSpPr>
             <a:spLocks noGrp="1"/>
           </p:cNvSpPr>
@@ -1857,13 +1771,7 @@
       </p:sp>
       <p:sp>
         <p:nvSpPr>
-          <p:cNvPr id="6" name="Slide Number Placeholder 5">
-            <a:extLst>
-              <a:ext uri="{FF2B5EF4-FFF2-40B4-BE49-F238E27FC236}">
-                <a16:creationId xmlns:a16="http://schemas.microsoft.com/office/drawing/2014/main" id="{77EA8C89-5C77-4E1E-8070-C49663F11AAF}"/>
-              </a:ext>
-            </a:extLst>
-          </p:cNvPr>
+          <p:cNvPr id="6" name="Slide Number Placeholder 5"/>
           <p:cNvSpPr>
             <a:spLocks noGrp="1"/>
           </p:cNvSpPr>
@@ -1887,7 +1795,7 @@
     </p:spTree>
     <p:extLst>
       <p:ext uri="{BB962C8B-B14F-4D97-AF65-F5344CB8AC3E}">
-        <p14:creationId xmlns:p14="http://schemas.microsoft.com/office/powerpoint/2010/main" val="4063191241"/>
+        <p14:creationId xmlns:p14="http://schemas.microsoft.com/office/powerpoint/2010/main" val="1732400248"/>
       </p:ext>
     </p:extLst>
   </p:cSld>
@@ -1916,13 +1824,7 @@
       </p:grpSpPr>
       <p:sp>
         <p:nvSpPr>
-          <p:cNvPr id="2" name="Title 1">
-            <a:extLst>
-              <a:ext uri="{FF2B5EF4-FFF2-40B4-BE49-F238E27FC236}">
-                <a16:creationId xmlns:a16="http://schemas.microsoft.com/office/drawing/2014/main" id="{4D04B394-4D59-44E3-BA71-BC8008D4E5E9}"/>
-              </a:ext>
-            </a:extLst>
-          </p:cNvPr>
+          <p:cNvPr id="2" name="Title 1"/>
           <p:cNvSpPr>
             <a:spLocks noGrp="1"/>
           </p:cNvSpPr>
@@ -1932,8 +1834,8 @@
         </p:nvSpPr>
         <p:spPr>
           <a:xfrm>
-            <a:off x="831850" y="1709738"/>
-            <a:ext cx="10515600" cy="2852737"/>
+            <a:off x="623888" y="1709739"/>
+            <a:ext cx="7886700" cy="2852737"/>
           </a:xfrm>
         </p:spPr>
         <p:txBody>
@@ -1945,21 +1847,16 @@
           </a:lstStyle>
           <a:p>
             <a:r>
-              <a:rPr lang="en-US"/>
+              <a:rPr lang="en-US" smtClean="0"/>
               <a:t>Click to edit Master title style</a:t>
             </a:r>
-          </a:p>
-        </p:txBody>
-      </p:sp>
-      <p:sp>
-        <p:nvSpPr>
-          <p:cNvPr id="3" name="Text Placeholder 2">
-            <a:extLst>
-              <a:ext uri="{FF2B5EF4-FFF2-40B4-BE49-F238E27FC236}">
-                <a16:creationId xmlns:a16="http://schemas.microsoft.com/office/drawing/2014/main" id="{96E33824-F54B-48C4-9201-E08EBAE2E127}"/>
-              </a:ext>
-            </a:extLst>
-          </p:cNvPr>
+            <a:endParaRPr lang="en-US" dirty="0"/>
+          </a:p>
+        </p:txBody>
+      </p:sp>
+      <p:sp>
+        <p:nvSpPr>
+          <p:cNvPr id="3" name="Text Placeholder 2"/>
           <p:cNvSpPr>
             <a:spLocks noGrp="1"/>
           </p:cNvSpPr>
@@ -1969,8 +1866,8 @@
         </p:nvSpPr>
         <p:spPr>
           <a:xfrm>
-            <a:off x="831850" y="4589463"/>
-            <a:ext cx="10515600" cy="1500187"/>
+            <a:off x="623888" y="4589464"/>
+            <a:ext cx="7886700" cy="1500187"/>
           </a:xfrm>
         </p:spPr>
         <p:txBody>
@@ -1980,9 +1877,7 @@
               <a:buNone/>
               <a:defRPr sz="2400">
                 <a:solidFill>
-                  <a:schemeClr val="tx1">
-                    <a:tint val="75000"/>
-                  </a:schemeClr>
+                  <a:schemeClr val="tx1"/>
                 </a:solidFill>
               </a:defRPr>
             </a:lvl1pPr>
@@ -2070,21 +1965,15 @@
           <a:p>
             <a:pPr lvl="0"/>
             <a:r>
-              <a:rPr lang="en-US"/>
-              <a:t>Click to edit Master text styles</a:t>
-            </a:r>
-          </a:p>
-        </p:txBody>
-      </p:sp>
-      <p:sp>
-        <p:nvSpPr>
-          <p:cNvPr id="4" name="Date Placeholder 3">
-            <a:extLst>
-              <a:ext uri="{FF2B5EF4-FFF2-40B4-BE49-F238E27FC236}">
-                <a16:creationId xmlns:a16="http://schemas.microsoft.com/office/drawing/2014/main" id="{0019A83A-8CAC-47AB-AE4E-CF39E22C8D7E}"/>
-              </a:ext>
-            </a:extLst>
-          </p:cNvPr>
+              <a:rPr lang="en-US" smtClean="0"/>
+              <a:t>Edit Master text styles</a:t>
+            </a:r>
+          </a:p>
+        </p:txBody>
+      </p:sp>
+      <p:sp>
+        <p:nvSpPr>
+          <p:cNvPr id="4" name="Date Placeholder 3"/>
           <p:cNvSpPr>
             <a:spLocks noGrp="1"/>
           </p:cNvSpPr>
@@ -2099,7 +1988,7 @@
           <a:p>
             <a:fld id="{CE003715-055B-4567-A5EE-A0CFAD250621}" type="datetimeFigureOut">
               <a:rPr lang="en-US" smtClean="0"/>
-              <a:t>7/2/2019</a:t>
+              <a:t>7/15/2019</a:t>
             </a:fld>
             <a:endParaRPr lang="en-US"/>
           </a:p>
@@ -2107,13 +1996,7 @@
       </p:sp>
       <p:sp>
         <p:nvSpPr>
-          <p:cNvPr id="5" name="Footer Placeholder 4">
-            <a:extLst>
-              <a:ext uri="{FF2B5EF4-FFF2-40B4-BE49-F238E27FC236}">
-                <a16:creationId xmlns:a16="http://schemas.microsoft.com/office/drawing/2014/main" id="{7F401385-8600-42A7-B6C5-B96F2A2BBBDE}"/>
-              </a:ext>
-            </a:extLst>
-          </p:cNvPr>
+          <p:cNvPr id="5" name="Footer Placeholder 4"/>
           <p:cNvSpPr>
             <a:spLocks noGrp="1"/>
           </p:cNvSpPr>
@@ -2132,13 +2015,7 @@
       </p:sp>
       <p:sp>
         <p:nvSpPr>
-          <p:cNvPr id="6" name="Slide Number Placeholder 5">
-            <a:extLst>
-              <a:ext uri="{FF2B5EF4-FFF2-40B4-BE49-F238E27FC236}">
-                <a16:creationId xmlns:a16="http://schemas.microsoft.com/office/drawing/2014/main" id="{9531C848-E86F-4FC8-9172-500DA3554717}"/>
-              </a:ext>
-            </a:extLst>
-          </p:cNvPr>
+          <p:cNvPr id="6" name="Slide Number Placeholder 5"/>
           <p:cNvSpPr>
             <a:spLocks noGrp="1"/>
           </p:cNvSpPr>
@@ -2162,7 +2039,7 @@
     </p:spTree>
     <p:extLst>
       <p:ext uri="{BB962C8B-B14F-4D97-AF65-F5344CB8AC3E}">
-        <p14:creationId xmlns:p14="http://schemas.microsoft.com/office/powerpoint/2010/main" val="2747106297"/>
+        <p14:creationId xmlns:p14="http://schemas.microsoft.com/office/powerpoint/2010/main" val="1896015260"/>
       </p:ext>
     </p:extLst>
   </p:cSld>
@@ -2191,13 +2068,7 @@
       </p:grpSpPr>
       <p:sp>
         <p:nvSpPr>
-          <p:cNvPr id="2" name="Title 1">
-            <a:extLst>
-              <a:ext uri="{FF2B5EF4-FFF2-40B4-BE49-F238E27FC236}">
-                <a16:creationId xmlns:a16="http://schemas.microsoft.com/office/drawing/2014/main" id="{33360582-81FB-4941-9B9C-723677C56B52}"/>
-              </a:ext>
-            </a:extLst>
-          </p:cNvPr>
+          <p:cNvPr id="2" name="Title 1"/>
           <p:cNvSpPr>
             <a:spLocks noGrp="1"/>
           </p:cNvSpPr>
@@ -2211,21 +2082,16 @@
           <a:lstStyle/>
           <a:p>
             <a:r>
-              <a:rPr lang="en-US"/>
+              <a:rPr lang="en-US" smtClean="0"/>
               <a:t>Click to edit Master title style</a:t>
             </a:r>
-          </a:p>
-        </p:txBody>
-      </p:sp>
-      <p:sp>
-        <p:nvSpPr>
-          <p:cNvPr id="3" name="Content Placeholder 2">
-            <a:extLst>
-              <a:ext uri="{FF2B5EF4-FFF2-40B4-BE49-F238E27FC236}">
-                <a16:creationId xmlns:a16="http://schemas.microsoft.com/office/drawing/2014/main" id="{DF87C5A1-28E5-45F4-93C5-B861B96D5AE5}"/>
-              </a:ext>
-            </a:extLst>
-          </p:cNvPr>
+            <a:endParaRPr lang="en-US" dirty="0"/>
+          </a:p>
+        </p:txBody>
+      </p:sp>
+      <p:sp>
+        <p:nvSpPr>
+          <p:cNvPr id="3" name="Content Placeholder 2"/>
           <p:cNvSpPr>
             <a:spLocks noGrp="1"/>
           </p:cNvSpPr>
@@ -2235,8 +2101,8 @@
         </p:nvSpPr>
         <p:spPr>
           <a:xfrm>
-            <a:off x="838200" y="1825625"/>
-            <a:ext cx="5181600" cy="4351338"/>
+            <a:off x="628650" y="1825625"/>
+            <a:ext cx="3886200" cy="4351338"/>
           </a:xfrm>
         </p:spPr>
         <p:txBody>
@@ -2245,49 +2111,44 @@
           <a:p>
             <a:pPr lvl="0"/>
             <a:r>
-              <a:rPr lang="en-US"/>
-              <a:t>Click to edit Master text styles</a:t>
+              <a:rPr lang="en-US" smtClean="0"/>
+              <a:t>Edit Master text styles</a:t>
             </a:r>
           </a:p>
           <a:p>
             <a:pPr lvl="1"/>
             <a:r>
-              <a:rPr lang="en-US"/>
+              <a:rPr lang="en-US" smtClean="0"/>
               <a:t>Second level</a:t>
             </a:r>
           </a:p>
           <a:p>
             <a:pPr lvl="2"/>
             <a:r>
-              <a:rPr lang="en-US"/>
+              <a:rPr lang="en-US" smtClean="0"/>
               <a:t>Third level</a:t>
             </a:r>
           </a:p>
           <a:p>
             <a:pPr lvl="3"/>
             <a:r>
-              <a:rPr lang="en-US"/>
+              <a:rPr lang="en-US" smtClean="0"/>
               <a:t>Fourth level</a:t>
             </a:r>
           </a:p>
           <a:p>
             <a:pPr lvl="4"/>
             <a:r>
-              <a:rPr lang="en-US"/>
+              <a:rPr lang="en-US" smtClean="0"/>
               <a:t>Fifth level</a:t>
             </a:r>
-          </a:p>
-        </p:txBody>
-      </p:sp>
-      <p:sp>
-        <p:nvSpPr>
-          <p:cNvPr id="4" name="Content Placeholder 3">
-            <a:extLst>
-              <a:ext uri="{FF2B5EF4-FFF2-40B4-BE49-F238E27FC236}">
-                <a16:creationId xmlns:a16="http://schemas.microsoft.com/office/drawing/2014/main" id="{6D75ED73-A07C-4993-B3A1-C5CCC79A7801}"/>
-              </a:ext>
-            </a:extLst>
-          </p:cNvPr>
+            <a:endParaRPr lang="en-US" dirty="0"/>
+          </a:p>
+        </p:txBody>
+      </p:sp>
+      <p:sp>
+        <p:nvSpPr>
+          <p:cNvPr id="4" name="Content Placeholder 3"/>
           <p:cNvSpPr>
             <a:spLocks noGrp="1"/>
           </p:cNvSpPr>
@@ -2297,8 +2158,8 @@
         </p:nvSpPr>
         <p:spPr>
           <a:xfrm>
-            <a:off x="6172200" y="1825625"/>
-            <a:ext cx="5181600" cy="4351338"/>
+            <a:off x="4629150" y="1825625"/>
+            <a:ext cx="3886200" cy="4351338"/>
           </a:xfrm>
         </p:spPr>
         <p:txBody>
@@ -2307,49 +2168,44 @@
           <a:p>
             <a:pPr lvl="0"/>
             <a:r>
-              <a:rPr lang="en-US"/>
-              <a:t>Click to edit Master text styles</a:t>
+              <a:rPr lang="en-US" smtClean="0"/>
+              <a:t>Edit Master text styles</a:t>
             </a:r>
           </a:p>
           <a:p>
             <a:pPr lvl="1"/>
             <a:r>
-              <a:rPr lang="en-US"/>
+              <a:rPr lang="en-US" smtClean="0"/>
               <a:t>Second level</a:t>
             </a:r>
           </a:p>
           <a:p>
             <a:pPr lvl="2"/>
             <a:r>
-              <a:rPr lang="en-US"/>
+              <a:rPr lang="en-US" smtClean="0"/>
               <a:t>Third level</a:t>
             </a:r>
           </a:p>
           <a:p>
             <a:pPr lvl="3"/>
             <a:r>
-              <a:rPr lang="en-US"/>
+              <a:rPr lang="en-US" smtClean="0"/>
               <a:t>Fourth level</a:t>
             </a:r>
           </a:p>
           <a:p>
             <a:pPr lvl="4"/>
             <a:r>
-              <a:rPr lang="en-US"/>
+              <a:rPr lang="en-US" smtClean="0"/>
               <a:t>Fifth level</a:t>
             </a:r>
-          </a:p>
-        </p:txBody>
-      </p:sp>
-      <p:sp>
-        <p:nvSpPr>
-          <p:cNvPr id="5" name="Date Placeholder 4">
-            <a:extLst>
-              <a:ext uri="{FF2B5EF4-FFF2-40B4-BE49-F238E27FC236}">
-                <a16:creationId xmlns:a16="http://schemas.microsoft.com/office/drawing/2014/main" id="{842D742A-4948-4819-A682-835C25DF9025}"/>
-              </a:ext>
-            </a:extLst>
-          </p:cNvPr>
+            <a:endParaRPr lang="en-US" dirty="0"/>
+          </a:p>
+        </p:txBody>
+      </p:sp>
+      <p:sp>
+        <p:nvSpPr>
+          <p:cNvPr id="5" name="Date Placeholder 4"/>
           <p:cNvSpPr>
             <a:spLocks noGrp="1"/>
           </p:cNvSpPr>
@@ -2364,7 +2220,7 @@
           <a:p>
             <a:fld id="{CE003715-055B-4567-A5EE-A0CFAD250621}" type="datetimeFigureOut">
               <a:rPr lang="en-US" smtClean="0"/>
-              <a:t>7/2/2019</a:t>
+              <a:t>7/15/2019</a:t>
             </a:fld>
             <a:endParaRPr lang="en-US"/>
           </a:p>
@@ -2372,13 +2228,7 @@
       </p:sp>
       <p:sp>
         <p:nvSpPr>
-          <p:cNvPr id="6" name="Footer Placeholder 5">
-            <a:extLst>
-              <a:ext uri="{FF2B5EF4-FFF2-40B4-BE49-F238E27FC236}">
-                <a16:creationId xmlns:a16="http://schemas.microsoft.com/office/drawing/2014/main" id="{5A4B3986-0BAB-4856-B998-E6066DE2B715}"/>
-              </a:ext>
-            </a:extLst>
-          </p:cNvPr>
+          <p:cNvPr id="6" name="Footer Placeholder 5"/>
           <p:cNvSpPr>
             <a:spLocks noGrp="1"/>
           </p:cNvSpPr>
@@ -2397,13 +2247,7 @@
       </p:sp>
       <p:sp>
         <p:nvSpPr>
-          <p:cNvPr id="7" name="Slide Number Placeholder 6">
-            <a:extLst>
-              <a:ext uri="{FF2B5EF4-FFF2-40B4-BE49-F238E27FC236}">
-                <a16:creationId xmlns:a16="http://schemas.microsoft.com/office/drawing/2014/main" id="{C2F7717A-231C-4581-A856-E79364236DED}"/>
-              </a:ext>
-            </a:extLst>
-          </p:cNvPr>
+          <p:cNvPr id="7" name="Slide Number Placeholder 6"/>
           <p:cNvSpPr>
             <a:spLocks noGrp="1"/>
           </p:cNvSpPr>
@@ -2427,7 +2271,7 @@
     </p:spTree>
     <p:extLst>
       <p:ext uri="{BB962C8B-B14F-4D97-AF65-F5344CB8AC3E}">
-        <p14:creationId xmlns:p14="http://schemas.microsoft.com/office/powerpoint/2010/main" val="1163808952"/>
+        <p14:creationId xmlns:p14="http://schemas.microsoft.com/office/powerpoint/2010/main" val="925153775"/>
       </p:ext>
     </p:extLst>
   </p:cSld>
@@ -2456,13 +2300,7 @@
       </p:grpSpPr>
       <p:sp>
         <p:nvSpPr>
-          <p:cNvPr id="2" name="Title 1">
-            <a:extLst>
-              <a:ext uri="{FF2B5EF4-FFF2-40B4-BE49-F238E27FC236}">
-                <a16:creationId xmlns:a16="http://schemas.microsoft.com/office/drawing/2014/main" id="{7B7D8A9A-BF77-4780-85A7-91F6FE65975F}"/>
-              </a:ext>
-            </a:extLst>
-          </p:cNvPr>
+          <p:cNvPr id="2" name="Title 1"/>
           <p:cNvSpPr>
             <a:spLocks noGrp="1"/>
           </p:cNvSpPr>
@@ -2472,8 +2310,8 @@
         </p:nvSpPr>
         <p:spPr>
           <a:xfrm>
-            <a:off x="839788" y="365125"/>
-            <a:ext cx="10515600" cy="1325563"/>
+            <a:off x="629841" y="365126"/>
+            <a:ext cx="7886700" cy="1325563"/>
           </a:xfrm>
         </p:spPr>
         <p:txBody>
@@ -2481,21 +2319,16 @@
           <a:lstStyle/>
           <a:p>
             <a:r>
-              <a:rPr lang="en-US"/>
+              <a:rPr lang="en-US" smtClean="0"/>
               <a:t>Click to edit Master title style</a:t>
             </a:r>
-          </a:p>
-        </p:txBody>
-      </p:sp>
-      <p:sp>
-        <p:nvSpPr>
-          <p:cNvPr id="3" name="Text Placeholder 2">
-            <a:extLst>
-              <a:ext uri="{FF2B5EF4-FFF2-40B4-BE49-F238E27FC236}">
-                <a16:creationId xmlns:a16="http://schemas.microsoft.com/office/drawing/2014/main" id="{A8E6C864-3428-4FED-8ED2-076BBB80B2D0}"/>
-              </a:ext>
-            </a:extLst>
-          </p:cNvPr>
+            <a:endParaRPr lang="en-US" dirty="0"/>
+          </a:p>
+        </p:txBody>
+      </p:sp>
+      <p:sp>
+        <p:nvSpPr>
+          <p:cNvPr id="3" name="Text Placeholder 2"/>
           <p:cNvSpPr>
             <a:spLocks noGrp="1"/>
           </p:cNvSpPr>
@@ -2505,8 +2338,8 @@
         </p:nvSpPr>
         <p:spPr>
           <a:xfrm>
-            <a:off x="839788" y="1681163"/>
-            <a:ext cx="5157787" cy="823912"/>
+            <a:off x="629842" y="1681163"/>
+            <a:ext cx="3868340" cy="823912"/>
           </a:xfrm>
         </p:spPr>
         <p:txBody>
@@ -2552,21 +2385,15 @@
           <a:p>
             <a:pPr lvl="0"/>
             <a:r>
-              <a:rPr lang="en-US"/>
-              <a:t>Click to edit Master text styles</a:t>
-            </a:r>
-          </a:p>
-        </p:txBody>
-      </p:sp>
-      <p:sp>
-        <p:nvSpPr>
-          <p:cNvPr id="4" name="Content Placeholder 3">
-            <a:extLst>
-              <a:ext uri="{FF2B5EF4-FFF2-40B4-BE49-F238E27FC236}">
-                <a16:creationId xmlns:a16="http://schemas.microsoft.com/office/drawing/2014/main" id="{9A1E7C1E-5EBE-409F-995D-CEBF7E0CFFF2}"/>
-              </a:ext>
-            </a:extLst>
-          </p:cNvPr>
+              <a:rPr lang="en-US" smtClean="0"/>
+              <a:t>Edit Master text styles</a:t>
+            </a:r>
+          </a:p>
+        </p:txBody>
+      </p:sp>
+      <p:sp>
+        <p:nvSpPr>
+          <p:cNvPr id="4" name="Content Placeholder 3"/>
           <p:cNvSpPr>
             <a:spLocks noGrp="1"/>
           </p:cNvSpPr>
@@ -2576,8 +2403,8 @@
         </p:nvSpPr>
         <p:spPr>
           <a:xfrm>
-            <a:off x="839788" y="2505075"/>
-            <a:ext cx="5157787" cy="3684588"/>
+            <a:off x="629842" y="2505075"/>
+            <a:ext cx="3868340" cy="3684588"/>
           </a:xfrm>
         </p:spPr>
         <p:txBody>
@@ -2586,49 +2413,44 @@
           <a:p>
             <a:pPr lvl="0"/>
             <a:r>
-              <a:rPr lang="en-US"/>
-              <a:t>Click to edit Master text styles</a:t>
+              <a:rPr lang="en-US" smtClean="0"/>
+              <a:t>Edit Master text styles</a:t>
             </a:r>
           </a:p>
           <a:p>
             <a:pPr lvl="1"/>
             <a:r>
-              <a:rPr lang="en-US"/>
+              <a:rPr lang="en-US" smtClean="0"/>
               <a:t>Second level</a:t>
             </a:r>
           </a:p>
           <a:p>
             <a:pPr lvl="2"/>
             <a:r>
-              <a:rPr lang="en-US"/>
+              <a:rPr lang="en-US" smtClean="0"/>
               <a:t>Third level</a:t>
             </a:r>
           </a:p>
           <a:p>
             <a:pPr lvl="3"/>
             <a:r>
-              <a:rPr lang="en-US"/>
+              <a:rPr lang="en-US" smtClean="0"/>
               <a:t>Fourth level</a:t>
             </a:r>
           </a:p>
           <a:p>
             <a:pPr lvl="4"/>
             <a:r>
-              <a:rPr lang="en-US"/>
+              <a:rPr lang="en-US" smtClean="0"/>
               <a:t>Fifth level</a:t>
             </a:r>
-          </a:p>
-        </p:txBody>
-      </p:sp>
-      <p:sp>
-        <p:nvSpPr>
-          <p:cNvPr id="5" name="Text Placeholder 4">
-            <a:extLst>
-              <a:ext uri="{FF2B5EF4-FFF2-40B4-BE49-F238E27FC236}">
-                <a16:creationId xmlns:a16="http://schemas.microsoft.com/office/drawing/2014/main" id="{6FEBC348-9954-4B03-8626-DE85D3C4C1F6}"/>
-              </a:ext>
-            </a:extLst>
-          </p:cNvPr>
+            <a:endParaRPr lang="en-US" dirty="0"/>
+          </a:p>
+        </p:txBody>
+      </p:sp>
+      <p:sp>
+        <p:nvSpPr>
+          <p:cNvPr id="5" name="Text Placeholder 4"/>
           <p:cNvSpPr>
             <a:spLocks noGrp="1"/>
           </p:cNvSpPr>
@@ -2638,8 +2460,8 @@
         </p:nvSpPr>
         <p:spPr>
           <a:xfrm>
-            <a:off x="6172200" y="1681163"/>
-            <a:ext cx="5183188" cy="823912"/>
+            <a:off x="4629150" y="1681163"/>
+            <a:ext cx="3887391" cy="823912"/>
           </a:xfrm>
         </p:spPr>
         <p:txBody>
@@ -2685,21 +2507,15 @@
           <a:p>
             <a:pPr lvl="0"/>
             <a:r>
-              <a:rPr lang="en-US"/>
-              <a:t>Click to edit Master text styles</a:t>
-            </a:r>
-          </a:p>
-        </p:txBody>
-      </p:sp>
-      <p:sp>
-        <p:nvSpPr>
-          <p:cNvPr id="6" name="Content Placeholder 5">
-            <a:extLst>
-              <a:ext uri="{FF2B5EF4-FFF2-40B4-BE49-F238E27FC236}">
-                <a16:creationId xmlns:a16="http://schemas.microsoft.com/office/drawing/2014/main" id="{D9AE4D6A-C240-4271-98DF-90E1A37CAFB5}"/>
-              </a:ext>
-            </a:extLst>
-          </p:cNvPr>
+              <a:rPr lang="en-US" smtClean="0"/>
+              <a:t>Edit Master text styles</a:t>
+            </a:r>
+          </a:p>
+        </p:txBody>
+      </p:sp>
+      <p:sp>
+        <p:nvSpPr>
+          <p:cNvPr id="6" name="Content Placeholder 5"/>
           <p:cNvSpPr>
             <a:spLocks noGrp="1"/>
           </p:cNvSpPr>
@@ -2709,8 +2525,8 @@
         </p:nvSpPr>
         <p:spPr>
           <a:xfrm>
-            <a:off x="6172200" y="2505075"/>
-            <a:ext cx="5183188" cy="3684588"/>
+            <a:off x="4629150" y="2505075"/>
+            <a:ext cx="3887391" cy="3684588"/>
           </a:xfrm>
         </p:spPr>
         <p:txBody>
@@ -2719,49 +2535,44 @@
           <a:p>
             <a:pPr lvl="0"/>
             <a:r>
-              <a:rPr lang="en-US"/>
-              <a:t>Click to edit Master text styles</a:t>
+              <a:rPr lang="en-US" smtClean="0"/>
+              <a:t>Edit Master text styles</a:t>
             </a:r>
           </a:p>
           <a:p>
             <a:pPr lvl="1"/>
             <a:r>
-              <a:rPr lang="en-US"/>
+              <a:rPr lang="en-US" smtClean="0"/>
               <a:t>Second level</a:t>
             </a:r>
           </a:p>
           <a:p>
             <a:pPr lvl="2"/>
             <a:r>
-              <a:rPr lang="en-US"/>
+              <a:rPr lang="en-US" smtClean="0"/>
               <a:t>Third level</a:t>
             </a:r>
           </a:p>
           <a:p>
             <a:pPr lvl="3"/>
             <a:r>
-              <a:rPr lang="en-US"/>
+              <a:rPr lang="en-US" smtClean="0"/>
               <a:t>Fourth level</a:t>
             </a:r>
           </a:p>
           <a:p>
             <a:pPr lvl="4"/>
             <a:r>
-              <a:rPr lang="en-US"/>
+              <a:rPr lang="en-US" smtClean="0"/>
               <a:t>Fifth level</a:t>
             </a:r>
-          </a:p>
-        </p:txBody>
-      </p:sp>
-      <p:sp>
-        <p:nvSpPr>
-          <p:cNvPr id="7" name="Date Placeholder 6">
-            <a:extLst>
-              <a:ext uri="{FF2B5EF4-FFF2-40B4-BE49-F238E27FC236}">
-                <a16:creationId xmlns:a16="http://schemas.microsoft.com/office/drawing/2014/main" id="{9932B6B5-9107-420D-A5AA-2CB9C411364C}"/>
-              </a:ext>
-            </a:extLst>
-          </p:cNvPr>
+            <a:endParaRPr lang="en-US" dirty="0"/>
+          </a:p>
+        </p:txBody>
+      </p:sp>
+      <p:sp>
+        <p:nvSpPr>
+          <p:cNvPr id="7" name="Date Placeholder 6"/>
           <p:cNvSpPr>
             <a:spLocks noGrp="1"/>
           </p:cNvSpPr>
@@ -2776,7 +2587,7 @@
           <a:p>
             <a:fld id="{CE003715-055B-4567-A5EE-A0CFAD250621}" type="datetimeFigureOut">
               <a:rPr lang="en-US" smtClean="0"/>
-              <a:t>7/2/2019</a:t>
+              <a:t>7/15/2019</a:t>
             </a:fld>
             <a:endParaRPr lang="en-US"/>
           </a:p>
@@ -2784,13 +2595,7 @@
       </p:sp>
       <p:sp>
         <p:nvSpPr>
-          <p:cNvPr id="8" name="Footer Placeholder 7">
-            <a:extLst>
-              <a:ext uri="{FF2B5EF4-FFF2-40B4-BE49-F238E27FC236}">
-                <a16:creationId xmlns:a16="http://schemas.microsoft.com/office/drawing/2014/main" id="{BA2A3150-686F-43FE-9C1E-B775D80847CC}"/>
-              </a:ext>
-            </a:extLst>
-          </p:cNvPr>
+          <p:cNvPr id="8" name="Footer Placeholder 7"/>
           <p:cNvSpPr>
             <a:spLocks noGrp="1"/>
           </p:cNvSpPr>
@@ -2809,13 +2614,7 @@
       </p:sp>
       <p:sp>
         <p:nvSpPr>
-          <p:cNvPr id="9" name="Slide Number Placeholder 8">
-            <a:extLst>
-              <a:ext uri="{FF2B5EF4-FFF2-40B4-BE49-F238E27FC236}">
-                <a16:creationId xmlns:a16="http://schemas.microsoft.com/office/drawing/2014/main" id="{8900CA63-E78B-41BA-B1C9-3D867F609064}"/>
-              </a:ext>
-            </a:extLst>
-          </p:cNvPr>
+          <p:cNvPr id="9" name="Slide Number Placeholder 8"/>
           <p:cNvSpPr>
             <a:spLocks noGrp="1"/>
           </p:cNvSpPr>
@@ -2839,7 +2638,7 @@
     </p:spTree>
     <p:extLst>
       <p:ext uri="{BB962C8B-B14F-4D97-AF65-F5344CB8AC3E}">
-        <p14:creationId xmlns:p14="http://schemas.microsoft.com/office/powerpoint/2010/main" val="899673222"/>
+        <p14:creationId xmlns:p14="http://schemas.microsoft.com/office/powerpoint/2010/main" val="3101613303"/>
       </p:ext>
     </p:extLst>
   </p:cSld>
@@ -2868,13 +2667,7 @@
       </p:grpSpPr>
       <p:sp>
         <p:nvSpPr>
-          <p:cNvPr id="2" name="Title 1">
-            <a:extLst>
-              <a:ext uri="{FF2B5EF4-FFF2-40B4-BE49-F238E27FC236}">
-                <a16:creationId xmlns:a16="http://schemas.microsoft.com/office/drawing/2014/main" id="{E256D905-D3A8-4003-8BE2-A6B95053B46B}"/>
-              </a:ext>
-            </a:extLst>
-          </p:cNvPr>
+          <p:cNvPr id="2" name="Title 1"/>
           <p:cNvSpPr>
             <a:spLocks noGrp="1"/>
           </p:cNvSpPr>
@@ -2888,21 +2681,16 @@
           <a:lstStyle/>
           <a:p>
             <a:r>
-              <a:rPr lang="en-US"/>
+              <a:rPr lang="en-US" smtClean="0"/>
               <a:t>Click to edit Master title style</a:t>
             </a:r>
-          </a:p>
-        </p:txBody>
-      </p:sp>
-      <p:sp>
-        <p:nvSpPr>
-          <p:cNvPr id="3" name="Date Placeholder 2">
-            <a:extLst>
-              <a:ext uri="{FF2B5EF4-FFF2-40B4-BE49-F238E27FC236}">
-                <a16:creationId xmlns:a16="http://schemas.microsoft.com/office/drawing/2014/main" id="{4A1A7F94-6782-4A20-9848-9B1E5FA1B107}"/>
-              </a:ext>
-            </a:extLst>
-          </p:cNvPr>
+            <a:endParaRPr lang="en-US" dirty="0"/>
+          </a:p>
+        </p:txBody>
+      </p:sp>
+      <p:sp>
+        <p:nvSpPr>
+          <p:cNvPr id="3" name="Date Placeholder 2"/>
           <p:cNvSpPr>
             <a:spLocks noGrp="1"/>
           </p:cNvSpPr>
@@ -2917,7 +2705,7 @@
           <a:p>
             <a:fld id="{CE003715-055B-4567-A5EE-A0CFAD250621}" type="datetimeFigureOut">
               <a:rPr lang="en-US" smtClean="0"/>
-              <a:t>7/2/2019</a:t>
+              <a:t>7/15/2019</a:t>
             </a:fld>
             <a:endParaRPr lang="en-US"/>
           </a:p>
@@ -2925,13 +2713,7 @@
       </p:sp>
       <p:sp>
         <p:nvSpPr>
-          <p:cNvPr id="4" name="Footer Placeholder 3">
-            <a:extLst>
-              <a:ext uri="{FF2B5EF4-FFF2-40B4-BE49-F238E27FC236}">
-                <a16:creationId xmlns:a16="http://schemas.microsoft.com/office/drawing/2014/main" id="{D83B05B9-77C7-4E96-8231-6983C906D391}"/>
-              </a:ext>
-            </a:extLst>
-          </p:cNvPr>
+          <p:cNvPr id="4" name="Footer Placeholder 3"/>
           <p:cNvSpPr>
             <a:spLocks noGrp="1"/>
           </p:cNvSpPr>
@@ -2950,13 +2732,7 @@
       </p:sp>
       <p:sp>
         <p:nvSpPr>
-          <p:cNvPr id="5" name="Slide Number Placeholder 4">
-            <a:extLst>
-              <a:ext uri="{FF2B5EF4-FFF2-40B4-BE49-F238E27FC236}">
-                <a16:creationId xmlns:a16="http://schemas.microsoft.com/office/drawing/2014/main" id="{975B5F01-4A07-43D4-908E-118036DF80B1}"/>
-              </a:ext>
-            </a:extLst>
-          </p:cNvPr>
+          <p:cNvPr id="5" name="Slide Number Placeholder 4"/>
           <p:cNvSpPr>
             <a:spLocks noGrp="1"/>
           </p:cNvSpPr>
@@ -2980,7 +2756,7 @@
     </p:spTree>
     <p:extLst>
       <p:ext uri="{BB962C8B-B14F-4D97-AF65-F5344CB8AC3E}">
-        <p14:creationId xmlns:p14="http://schemas.microsoft.com/office/powerpoint/2010/main" val="4033766213"/>
+        <p14:creationId xmlns:p14="http://schemas.microsoft.com/office/powerpoint/2010/main" val="826474433"/>
       </p:ext>
     </p:extLst>
   </p:cSld>
@@ -3009,13 +2785,7 @@
       </p:grpSpPr>
       <p:sp>
         <p:nvSpPr>
-          <p:cNvPr id="2" name="Date Placeholder 1">
-            <a:extLst>
-              <a:ext uri="{FF2B5EF4-FFF2-40B4-BE49-F238E27FC236}">
-                <a16:creationId xmlns:a16="http://schemas.microsoft.com/office/drawing/2014/main" id="{387564DA-D7BE-4F03-9D86-0A5E42543469}"/>
-              </a:ext>
-            </a:extLst>
-          </p:cNvPr>
+          <p:cNvPr id="2" name="Date Placeholder 1"/>
           <p:cNvSpPr>
             <a:spLocks noGrp="1"/>
           </p:cNvSpPr>
@@ -3030,7 +2800,7 @@
           <a:p>
             <a:fld id="{CE003715-055B-4567-A5EE-A0CFAD250621}" type="datetimeFigureOut">
               <a:rPr lang="en-US" smtClean="0"/>
-              <a:t>7/2/2019</a:t>
+              <a:t>7/15/2019</a:t>
             </a:fld>
             <a:endParaRPr lang="en-US"/>
           </a:p>
@@ -3038,13 +2808,7 @@
       </p:sp>
       <p:sp>
         <p:nvSpPr>
-          <p:cNvPr id="3" name="Footer Placeholder 2">
-            <a:extLst>
-              <a:ext uri="{FF2B5EF4-FFF2-40B4-BE49-F238E27FC236}">
-                <a16:creationId xmlns:a16="http://schemas.microsoft.com/office/drawing/2014/main" id="{11F161FA-E19D-4E57-A1E0-49ACE1E99D6D}"/>
-              </a:ext>
-            </a:extLst>
-          </p:cNvPr>
+          <p:cNvPr id="3" name="Footer Placeholder 2"/>
           <p:cNvSpPr>
             <a:spLocks noGrp="1"/>
           </p:cNvSpPr>
@@ -3063,13 +2827,7 @@
       </p:sp>
       <p:sp>
         <p:nvSpPr>
-          <p:cNvPr id="4" name="Slide Number Placeholder 3">
-            <a:extLst>
-              <a:ext uri="{FF2B5EF4-FFF2-40B4-BE49-F238E27FC236}">
-                <a16:creationId xmlns:a16="http://schemas.microsoft.com/office/drawing/2014/main" id="{1D93FB94-F3B2-4FD5-BFC7-0BB6917AE55E}"/>
-              </a:ext>
-            </a:extLst>
-          </p:cNvPr>
+          <p:cNvPr id="4" name="Slide Number Placeholder 3"/>
           <p:cNvSpPr>
             <a:spLocks noGrp="1"/>
           </p:cNvSpPr>
@@ -3093,7 +2851,7 @@
     </p:spTree>
     <p:extLst>
       <p:ext uri="{BB962C8B-B14F-4D97-AF65-F5344CB8AC3E}">
-        <p14:creationId xmlns:p14="http://schemas.microsoft.com/office/powerpoint/2010/main" val="4289967690"/>
+        <p14:creationId xmlns:p14="http://schemas.microsoft.com/office/powerpoint/2010/main" val="2227537076"/>
       </p:ext>
     </p:extLst>
   </p:cSld>
@@ -3122,13 +2880,7 @@
       </p:grpSpPr>
       <p:sp>
         <p:nvSpPr>
-          <p:cNvPr id="2" name="Title 1">
-            <a:extLst>
-              <a:ext uri="{FF2B5EF4-FFF2-40B4-BE49-F238E27FC236}">
-                <a16:creationId xmlns:a16="http://schemas.microsoft.com/office/drawing/2014/main" id="{FC979BB9-F319-40C7-94F4-D94859620261}"/>
-              </a:ext>
-            </a:extLst>
-          </p:cNvPr>
+          <p:cNvPr id="2" name="Title 1"/>
           <p:cNvSpPr>
             <a:spLocks noGrp="1"/>
           </p:cNvSpPr>
@@ -3138,8 +2890,8 @@
         </p:nvSpPr>
         <p:spPr>
           <a:xfrm>
-            <a:off x="839788" y="457200"/>
-            <a:ext cx="3932237" cy="1600200"/>
+            <a:off x="629841" y="457200"/>
+            <a:ext cx="2949178" cy="1600200"/>
           </a:xfrm>
         </p:spPr>
         <p:txBody>
@@ -3151,21 +2903,16 @@
           </a:lstStyle>
           <a:p>
             <a:r>
-              <a:rPr lang="en-US"/>
+              <a:rPr lang="en-US" smtClean="0"/>
               <a:t>Click to edit Master title style</a:t>
             </a:r>
-          </a:p>
-        </p:txBody>
-      </p:sp>
-      <p:sp>
-        <p:nvSpPr>
-          <p:cNvPr id="3" name="Content Placeholder 2">
-            <a:extLst>
-              <a:ext uri="{FF2B5EF4-FFF2-40B4-BE49-F238E27FC236}">
-                <a16:creationId xmlns:a16="http://schemas.microsoft.com/office/drawing/2014/main" id="{48638C12-E2FB-46DA-8611-BC3BED4E9E0E}"/>
-              </a:ext>
-            </a:extLst>
-          </p:cNvPr>
+            <a:endParaRPr lang="en-US" dirty="0"/>
+          </a:p>
+        </p:txBody>
+      </p:sp>
+      <p:sp>
+        <p:nvSpPr>
+          <p:cNvPr id="3" name="Content Placeholder 2"/>
           <p:cNvSpPr>
             <a:spLocks noGrp="1"/>
           </p:cNvSpPr>
@@ -3175,8 +2922,8 @@
         </p:nvSpPr>
         <p:spPr>
           <a:xfrm>
-            <a:off x="5183188" y="987425"/>
-            <a:ext cx="6172200" cy="4873625"/>
+            <a:off x="3887391" y="987426"/>
+            <a:ext cx="4629150" cy="4873625"/>
           </a:xfrm>
         </p:spPr>
         <p:txBody>
@@ -3213,49 +2960,44 @@
           <a:p>
             <a:pPr lvl="0"/>
             <a:r>
-              <a:rPr lang="en-US"/>
-              <a:t>Click to edit Master text styles</a:t>
+              <a:rPr lang="en-US" smtClean="0"/>
+              <a:t>Edit Master text styles</a:t>
             </a:r>
           </a:p>
           <a:p>
             <a:pPr lvl="1"/>
             <a:r>
-              <a:rPr lang="en-US"/>
+              <a:rPr lang="en-US" smtClean="0"/>
               <a:t>Second level</a:t>
             </a:r>
           </a:p>
           <a:p>
             <a:pPr lvl="2"/>
             <a:r>
-              <a:rPr lang="en-US"/>
+              <a:rPr lang="en-US" smtClean="0"/>
               <a:t>Third level</a:t>
             </a:r>
           </a:p>
           <a:p>
             <a:pPr lvl="3"/>
             <a:r>
-              <a:rPr lang="en-US"/>
+              <a:rPr lang="en-US" smtClean="0"/>
               <a:t>Fourth level</a:t>
             </a:r>
           </a:p>
           <a:p>
             <a:pPr lvl="4"/>
             <a:r>
-              <a:rPr lang="en-US"/>
+              <a:rPr lang="en-US" smtClean="0"/>
               <a:t>Fifth level</a:t>
             </a:r>
-          </a:p>
-        </p:txBody>
-      </p:sp>
-      <p:sp>
-        <p:nvSpPr>
-          <p:cNvPr id="4" name="Text Placeholder 3">
-            <a:extLst>
-              <a:ext uri="{FF2B5EF4-FFF2-40B4-BE49-F238E27FC236}">
-                <a16:creationId xmlns:a16="http://schemas.microsoft.com/office/drawing/2014/main" id="{EA6D24F1-DD5D-4AAA-B66B-C771F75C2FC4}"/>
-              </a:ext>
-            </a:extLst>
-          </p:cNvPr>
+            <a:endParaRPr lang="en-US" dirty="0"/>
+          </a:p>
+        </p:txBody>
+      </p:sp>
+      <p:sp>
+        <p:nvSpPr>
+          <p:cNvPr id="4" name="Text Placeholder 3"/>
           <p:cNvSpPr>
             <a:spLocks noGrp="1"/>
           </p:cNvSpPr>
@@ -3265,8 +3007,8 @@
         </p:nvSpPr>
         <p:spPr>
           <a:xfrm>
-            <a:off x="839788" y="2057400"/>
-            <a:ext cx="3932237" cy="3811588"/>
+            <a:off x="629841" y="2057400"/>
+            <a:ext cx="2949178" cy="3811588"/>
           </a:xfrm>
         </p:spPr>
         <p:txBody>
@@ -3312,21 +3054,15 @@
           <a:p>
             <a:pPr lvl="0"/>
             <a:r>
-              <a:rPr lang="en-US"/>
-              <a:t>Click to edit Master text styles</a:t>
-            </a:r>
-          </a:p>
-        </p:txBody>
-      </p:sp>
-      <p:sp>
-        <p:nvSpPr>
-          <p:cNvPr id="5" name="Date Placeholder 4">
-            <a:extLst>
-              <a:ext uri="{FF2B5EF4-FFF2-40B4-BE49-F238E27FC236}">
-                <a16:creationId xmlns:a16="http://schemas.microsoft.com/office/drawing/2014/main" id="{5E9BDC4E-F048-43B6-B9F6-8AD498CB05BD}"/>
-              </a:ext>
-            </a:extLst>
-          </p:cNvPr>
+              <a:rPr lang="en-US" smtClean="0"/>
+              <a:t>Edit Master text styles</a:t>
+            </a:r>
+          </a:p>
+        </p:txBody>
+      </p:sp>
+      <p:sp>
+        <p:nvSpPr>
+          <p:cNvPr id="5" name="Date Placeholder 4"/>
           <p:cNvSpPr>
             <a:spLocks noGrp="1"/>
           </p:cNvSpPr>
@@ -3341,7 +3077,7 @@
           <a:p>
             <a:fld id="{CE003715-055B-4567-A5EE-A0CFAD250621}" type="datetimeFigureOut">
               <a:rPr lang="en-US" smtClean="0"/>
-              <a:t>7/2/2019</a:t>
+              <a:t>7/15/2019</a:t>
             </a:fld>
             <a:endParaRPr lang="en-US"/>
           </a:p>
@@ -3349,13 +3085,7 @@
       </p:sp>
       <p:sp>
         <p:nvSpPr>
-          <p:cNvPr id="6" name="Footer Placeholder 5">
-            <a:extLst>
-              <a:ext uri="{FF2B5EF4-FFF2-40B4-BE49-F238E27FC236}">
-                <a16:creationId xmlns:a16="http://schemas.microsoft.com/office/drawing/2014/main" id="{53E657EB-DACA-46B6-B138-79C81BB850EB}"/>
-              </a:ext>
-            </a:extLst>
-          </p:cNvPr>
+          <p:cNvPr id="6" name="Footer Placeholder 5"/>
           <p:cNvSpPr>
             <a:spLocks noGrp="1"/>
           </p:cNvSpPr>
@@ -3374,13 +3104,7 @@
       </p:sp>
       <p:sp>
         <p:nvSpPr>
-          <p:cNvPr id="7" name="Slide Number Placeholder 6">
-            <a:extLst>
-              <a:ext uri="{FF2B5EF4-FFF2-40B4-BE49-F238E27FC236}">
-                <a16:creationId xmlns:a16="http://schemas.microsoft.com/office/drawing/2014/main" id="{F42EF2EF-168D-4160-8FFE-16AEADDEA05E}"/>
-              </a:ext>
-            </a:extLst>
-          </p:cNvPr>
+          <p:cNvPr id="7" name="Slide Number Placeholder 6"/>
           <p:cNvSpPr>
             <a:spLocks noGrp="1"/>
           </p:cNvSpPr>
@@ -3404,7 +3128,7 @@
     </p:spTree>
     <p:extLst>
       <p:ext uri="{BB962C8B-B14F-4D97-AF65-F5344CB8AC3E}">
-        <p14:creationId xmlns:p14="http://schemas.microsoft.com/office/powerpoint/2010/main" val="478063735"/>
+        <p14:creationId xmlns:p14="http://schemas.microsoft.com/office/powerpoint/2010/main" val="1828985163"/>
       </p:ext>
     </p:extLst>
   </p:cSld>
@@ -3433,13 +3157,7 @@
       </p:grpSpPr>
       <p:sp>
         <p:nvSpPr>
-          <p:cNvPr id="2" name="Title 1">
-            <a:extLst>
-              <a:ext uri="{FF2B5EF4-FFF2-40B4-BE49-F238E27FC236}">
-                <a16:creationId xmlns:a16="http://schemas.microsoft.com/office/drawing/2014/main" id="{C49EC69B-AC29-4595-9AC4-365F450D5FC4}"/>
-              </a:ext>
-            </a:extLst>
-          </p:cNvPr>
+          <p:cNvPr id="2" name="Title 1"/>
           <p:cNvSpPr>
             <a:spLocks noGrp="1"/>
           </p:cNvSpPr>
@@ -3449,8 +3167,8 @@
         </p:nvSpPr>
         <p:spPr>
           <a:xfrm>
-            <a:off x="839788" y="457200"/>
-            <a:ext cx="3932237" cy="1600200"/>
+            <a:off x="629841" y="457200"/>
+            <a:ext cx="2949178" cy="1600200"/>
           </a:xfrm>
         </p:spPr>
         <p:txBody>
@@ -3462,23 +3180,18 @@
           </a:lstStyle>
           <a:p>
             <a:r>
-              <a:rPr lang="en-US"/>
+              <a:rPr lang="en-US" smtClean="0"/>
               <a:t>Click to edit Master title style</a:t>
             </a:r>
-          </a:p>
-        </p:txBody>
-      </p:sp>
-      <p:sp>
-        <p:nvSpPr>
-          <p:cNvPr id="3" name="Picture Placeholder 2">
-            <a:extLst>
-              <a:ext uri="{FF2B5EF4-FFF2-40B4-BE49-F238E27FC236}">
-                <a16:creationId xmlns:a16="http://schemas.microsoft.com/office/drawing/2014/main" id="{E9B626D7-FBD0-4F71-B0A8-31787F626E21}"/>
-              </a:ext>
-            </a:extLst>
-          </p:cNvPr>
-          <p:cNvSpPr>
-            <a:spLocks noGrp="1"/>
+            <a:endParaRPr lang="en-US" dirty="0"/>
+          </a:p>
+        </p:txBody>
+      </p:sp>
+      <p:sp>
+        <p:nvSpPr>
+          <p:cNvPr id="3" name="Picture Placeholder 2"/>
+          <p:cNvSpPr>
+            <a:spLocks noGrp="1" noChangeAspect="1"/>
           </p:cNvSpPr>
           <p:nvPr>
             <p:ph type="pic" idx="1"/>
@@ -3486,12 +3199,12 @@
         </p:nvSpPr>
         <p:spPr>
           <a:xfrm>
-            <a:off x="5183188" y="987425"/>
-            <a:ext cx="6172200" cy="4873625"/>
+            <a:off x="3887391" y="987426"/>
+            <a:ext cx="4629150" cy="4873625"/>
           </a:xfrm>
         </p:spPr>
         <p:txBody>
-          <a:bodyPr/>
+          <a:bodyPr anchor="t"/>
           <a:lstStyle>
             <a:lvl1pPr marL="0" indent="0">
               <a:buNone/>
@@ -3531,19 +3244,17 @@
             </a:lvl9pPr>
           </a:lstStyle>
           <a:p>
-            <a:endParaRPr lang="en-US"/>
-          </a:p>
-        </p:txBody>
-      </p:sp>
-      <p:sp>
-        <p:nvSpPr>
-          <p:cNvPr id="4" name="Text Placeholder 3">
-            <a:extLst>
-              <a:ext uri="{FF2B5EF4-FFF2-40B4-BE49-F238E27FC236}">
-                <a16:creationId xmlns:a16="http://schemas.microsoft.com/office/drawing/2014/main" id="{3EF48FE5-FAA3-473F-8598-645C05D26895}"/>
-              </a:ext>
-            </a:extLst>
-          </p:cNvPr>
+            <a:r>
+              <a:rPr lang="en-US" smtClean="0"/>
+              <a:t>Click icon to add picture</a:t>
+            </a:r>
+            <a:endParaRPr lang="en-US" dirty="0"/>
+          </a:p>
+        </p:txBody>
+      </p:sp>
+      <p:sp>
+        <p:nvSpPr>
+          <p:cNvPr id="4" name="Text Placeholder 3"/>
           <p:cNvSpPr>
             <a:spLocks noGrp="1"/>
           </p:cNvSpPr>
@@ -3553,8 +3264,8 @@
         </p:nvSpPr>
         <p:spPr>
           <a:xfrm>
-            <a:off x="839788" y="2057400"/>
-            <a:ext cx="3932237" cy="3811588"/>
+            <a:off x="629841" y="2057400"/>
+            <a:ext cx="2949178" cy="3811588"/>
           </a:xfrm>
         </p:spPr>
         <p:txBody>
@@ -3600,21 +3311,15 @@
           <a:p>
             <a:pPr lvl="0"/>
             <a:r>
-              <a:rPr lang="en-US"/>
-              <a:t>Click to edit Master text styles</a:t>
-            </a:r>
-          </a:p>
-        </p:txBody>
-      </p:sp>
-      <p:sp>
-        <p:nvSpPr>
-          <p:cNvPr id="5" name="Date Placeholder 4">
-            <a:extLst>
-              <a:ext uri="{FF2B5EF4-FFF2-40B4-BE49-F238E27FC236}">
-                <a16:creationId xmlns:a16="http://schemas.microsoft.com/office/drawing/2014/main" id="{69198A43-E5F2-44EE-A081-B36DA88C0FCC}"/>
-              </a:ext>
-            </a:extLst>
-          </p:cNvPr>
+              <a:rPr lang="en-US" smtClean="0"/>
+              <a:t>Edit Master text styles</a:t>
+            </a:r>
+          </a:p>
+        </p:txBody>
+      </p:sp>
+      <p:sp>
+        <p:nvSpPr>
+          <p:cNvPr id="5" name="Date Placeholder 4"/>
           <p:cNvSpPr>
             <a:spLocks noGrp="1"/>
           </p:cNvSpPr>
@@ -3629,7 +3334,7 @@
           <a:p>
             <a:fld id="{CE003715-055B-4567-A5EE-A0CFAD250621}" type="datetimeFigureOut">
               <a:rPr lang="en-US" smtClean="0"/>
-              <a:t>7/2/2019</a:t>
+              <a:t>7/15/2019</a:t>
             </a:fld>
             <a:endParaRPr lang="en-US"/>
           </a:p>
@@ -3637,13 +3342,7 @@
       </p:sp>
       <p:sp>
         <p:nvSpPr>
-          <p:cNvPr id="6" name="Footer Placeholder 5">
-            <a:extLst>
-              <a:ext uri="{FF2B5EF4-FFF2-40B4-BE49-F238E27FC236}">
-                <a16:creationId xmlns:a16="http://schemas.microsoft.com/office/drawing/2014/main" id="{6CEE8AEA-ACA4-4BB3-B975-90046B6D00E5}"/>
-              </a:ext>
-            </a:extLst>
-          </p:cNvPr>
+          <p:cNvPr id="6" name="Footer Placeholder 5"/>
           <p:cNvSpPr>
             <a:spLocks noGrp="1"/>
           </p:cNvSpPr>
@@ -3662,13 +3361,7 @@
       </p:sp>
       <p:sp>
         <p:nvSpPr>
-          <p:cNvPr id="7" name="Slide Number Placeholder 6">
-            <a:extLst>
-              <a:ext uri="{FF2B5EF4-FFF2-40B4-BE49-F238E27FC236}">
-                <a16:creationId xmlns:a16="http://schemas.microsoft.com/office/drawing/2014/main" id="{0AD5E5F3-42AB-47F7-BF57-54A66967740E}"/>
-              </a:ext>
-            </a:extLst>
-          </p:cNvPr>
+          <p:cNvPr id="7" name="Slide Number Placeholder 6"/>
           <p:cNvSpPr>
             <a:spLocks noGrp="1"/>
           </p:cNvSpPr>
@@ -3692,7 +3385,7 @@
     </p:spTree>
     <p:extLst>
       <p:ext uri="{BB962C8B-B14F-4D97-AF65-F5344CB8AC3E}">
-        <p14:creationId xmlns:p14="http://schemas.microsoft.com/office/powerpoint/2010/main" val="2365847967"/>
+        <p14:creationId xmlns:p14="http://schemas.microsoft.com/office/powerpoint/2010/main" val="684062243"/>
       </p:ext>
     </p:extLst>
   </p:cSld>
@@ -3726,13 +3419,7 @@
       </p:grpSpPr>
       <p:sp>
         <p:nvSpPr>
-          <p:cNvPr id="2" name="Title Placeholder 1">
-            <a:extLst>
-              <a:ext uri="{FF2B5EF4-FFF2-40B4-BE49-F238E27FC236}">
-                <a16:creationId xmlns:a16="http://schemas.microsoft.com/office/drawing/2014/main" id="{6A58B707-3E52-4641-B8F8-82A855E07910}"/>
-              </a:ext>
-            </a:extLst>
-          </p:cNvPr>
+          <p:cNvPr id="2" name="Title Placeholder 1"/>
           <p:cNvSpPr>
             <a:spLocks noGrp="1"/>
           </p:cNvSpPr>
@@ -3742,8 +3429,8 @@
         </p:nvSpPr>
         <p:spPr>
           <a:xfrm>
-            <a:off x="838200" y="365125"/>
-            <a:ext cx="10515600" cy="1325563"/>
+            <a:off x="628650" y="365126"/>
+            <a:ext cx="7886700" cy="1325563"/>
           </a:xfrm>
           <a:prstGeom prst="rect">
             <a:avLst/>
@@ -3756,21 +3443,16 @@
           <a:lstStyle/>
           <a:p>
             <a:r>
-              <a:rPr lang="en-US"/>
+              <a:rPr lang="en-US" smtClean="0"/>
               <a:t>Click to edit Master title style</a:t>
             </a:r>
-          </a:p>
-        </p:txBody>
-      </p:sp>
-      <p:sp>
-        <p:nvSpPr>
-          <p:cNvPr id="3" name="Text Placeholder 2">
-            <a:extLst>
-              <a:ext uri="{FF2B5EF4-FFF2-40B4-BE49-F238E27FC236}">
-                <a16:creationId xmlns:a16="http://schemas.microsoft.com/office/drawing/2014/main" id="{35A03B6A-09C1-45F1-BA1F-08C586B8F1FD}"/>
-              </a:ext>
-            </a:extLst>
-          </p:cNvPr>
+            <a:endParaRPr lang="en-US" dirty="0"/>
+          </a:p>
+        </p:txBody>
+      </p:sp>
+      <p:sp>
+        <p:nvSpPr>
+          <p:cNvPr id="3" name="Text Placeholder 2"/>
           <p:cNvSpPr>
             <a:spLocks noGrp="1"/>
           </p:cNvSpPr>
@@ -3780,8 +3462,8 @@
         </p:nvSpPr>
         <p:spPr>
           <a:xfrm>
-            <a:off x="838200" y="1825625"/>
-            <a:ext cx="10515600" cy="4351338"/>
+            <a:off x="628650" y="1825625"/>
+            <a:ext cx="7886700" cy="4351338"/>
           </a:xfrm>
           <a:prstGeom prst="rect">
             <a:avLst/>
@@ -3795,49 +3477,44 @@
           <a:p>
             <a:pPr lvl="0"/>
             <a:r>
-              <a:rPr lang="en-US"/>
-              <a:t>Click to edit Master text styles</a:t>
+              <a:rPr lang="en-US" smtClean="0"/>
+              <a:t>Edit Master text styles</a:t>
             </a:r>
           </a:p>
           <a:p>
             <a:pPr lvl="1"/>
             <a:r>
-              <a:rPr lang="en-US"/>
+              <a:rPr lang="en-US" smtClean="0"/>
               <a:t>Second level</a:t>
             </a:r>
           </a:p>
           <a:p>
             <a:pPr lvl="2"/>
             <a:r>
-              <a:rPr lang="en-US"/>
+              <a:rPr lang="en-US" smtClean="0"/>
               <a:t>Third level</a:t>
             </a:r>
           </a:p>
           <a:p>
             <a:pPr lvl="3"/>
             <a:r>
-              <a:rPr lang="en-US"/>
+              <a:rPr lang="en-US" smtClean="0"/>
               <a:t>Fourth level</a:t>
             </a:r>
           </a:p>
           <a:p>
             <a:pPr lvl="4"/>
             <a:r>
-              <a:rPr lang="en-US"/>
+              <a:rPr lang="en-US" smtClean="0"/>
               <a:t>Fifth level</a:t>
             </a:r>
-          </a:p>
-        </p:txBody>
-      </p:sp>
-      <p:sp>
-        <p:nvSpPr>
-          <p:cNvPr id="4" name="Date Placeholder 3">
-            <a:extLst>
-              <a:ext uri="{FF2B5EF4-FFF2-40B4-BE49-F238E27FC236}">
-                <a16:creationId xmlns:a16="http://schemas.microsoft.com/office/drawing/2014/main" id="{7920A531-EC0A-441E-AD6F-0088D2C059F2}"/>
-              </a:ext>
-            </a:extLst>
-          </p:cNvPr>
+            <a:endParaRPr lang="en-US" dirty="0"/>
+          </a:p>
+        </p:txBody>
+      </p:sp>
+      <p:sp>
+        <p:nvSpPr>
+          <p:cNvPr id="4" name="Date Placeholder 3"/>
           <p:cNvSpPr>
             <a:spLocks noGrp="1"/>
           </p:cNvSpPr>
@@ -3847,8 +3524,8 @@
         </p:nvSpPr>
         <p:spPr>
           <a:xfrm>
-            <a:off x="838200" y="6356350"/>
-            <a:ext cx="2743200" cy="365125"/>
+            <a:off x="628650" y="6356351"/>
+            <a:ext cx="2057400" cy="365125"/>
           </a:xfrm>
           <a:prstGeom prst="rect">
             <a:avLst/>
@@ -3870,7 +3547,7 @@
           <a:p>
             <a:fld id="{CE003715-055B-4567-A5EE-A0CFAD250621}" type="datetimeFigureOut">
               <a:rPr lang="en-US" smtClean="0"/>
-              <a:t>7/2/2019</a:t>
+              <a:t>7/15/2019</a:t>
             </a:fld>
             <a:endParaRPr lang="en-US"/>
           </a:p>
@@ -3878,13 +3555,7 @@
       </p:sp>
       <p:sp>
         <p:nvSpPr>
-          <p:cNvPr id="5" name="Footer Placeholder 4">
-            <a:extLst>
-              <a:ext uri="{FF2B5EF4-FFF2-40B4-BE49-F238E27FC236}">
-                <a16:creationId xmlns:a16="http://schemas.microsoft.com/office/drawing/2014/main" id="{FD3D7718-23EB-4CA2-B056-0FC1F9E2FA23}"/>
-              </a:ext>
-            </a:extLst>
-          </p:cNvPr>
+          <p:cNvPr id="5" name="Footer Placeholder 4"/>
           <p:cNvSpPr>
             <a:spLocks noGrp="1"/>
           </p:cNvSpPr>
@@ -3894,8 +3565,8 @@
         </p:nvSpPr>
         <p:spPr>
           <a:xfrm>
-            <a:off x="4038600" y="6356350"/>
-            <a:ext cx="4114800" cy="365125"/>
+            <a:off x="3028950" y="6356351"/>
+            <a:ext cx="3086100" cy="365125"/>
           </a:xfrm>
           <a:prstGeom prst="rect">
             <a:avLst/>
@@ -3921,13 +3592,7 @@
       </p:sp>
       <p:sp>
         <p:nvSpPr>
-          <p:cNvPr id="6" name="Slide Number Placeholder 5">
-            <a:extLst>
-              <a:ext uri="{FF2B5EF4-FFF2-40B4-BE49-F238E27FC236}">
-                <a16:creationId xmlns:a16="http://schemas.microsoft.com/office/drawing/2014/main" id="{769ED05C-1B6E-4836-9070-A58E776B48B7}"/>
-              </a:ext>
-            </a:extLst>
-          </p:cNvPr>
+          <p:cNvPr id="6" name="Slide Number Placeholder 5"/>
           <p:cNvSpPr>
             <a:spLocks noGrp="1"/>
           </p:cNvSpPr>
@@ -3937,8 +3602,8 @@
         </p:nvSpPr>
         <p:spPr>
           <a:xfrm>
-            <a:off x="8610600" y="6356350"/>
-            <a:ext cx="2743200" cy="365125"/>
+            <a:off x="6457950" y="6356351"/>
+            <a:ext cx="2057400" cy="365125"/>
           </a:xfrm>
           <a:prstGeom prst="rect">
             <a:avLst/>
@@ -3969,27 +3634,27 @@
     </p:spTree>
     <p:extLst>
       <p:ext uri="{BB962C8B-B14F-4D97-AF65-F5344CB8AC3E}">
-        <p14:creationId xmlns:p14="http://schemas.microsoft.com/office/powerpoint/2010/main" val="1161767992"/>
+        <p14:creationId xmlns:p14="http://schemas.microsoft.com/office/powerpoint/2010/main" val="860999347"/>
       </p:ext>
     </p:extLst>
   </p:cSld>
   <p:clrMap bg1="lt1" tx1="dk1" bg2="lt2" tx2="dk2" accent1="accent1" accent2="accent2" accent3="accent3" accent4="accent4" accent5="accent5" accent6="accent6" hlink="hlink" folHlink="folHlink"/>
   <p:sldLayoutIdLst>
-    <p:sldLayoutId id="2147483649" r:id="rId1"/>
-    <p:sldLayoutId id="2147483650" r:id="rId2"/>
-    <p:sldLayoutId id="2147483651" r:id="rId3"/>
-    <p:sldLayoutId id="2147483652" r:id="rId4"/>
-    <p:sldLayoutId id="2147483653" r:id="rId5"/>
-    <p:sldLayoutId id="2147483654" r:id="rId6"/>
-    <p:sldLayoutId id="2147483655" r:id="rId7"/>
-    <p:sldLayoutId id="2147483656" r:id="rId8"/>
-    <p:sldLayoutId id="2147483657" r:id="rId9"/>
-    <p:sldLayoutId id="2147483658" r:id="rId10"/>
-    <p:sldLayoutId id="2147483659" r:id="rId11"/>
+    <p:sldLayoutId id="2147483661" r:id="rId1"/>
+    <p:sldLayoutId id="2147483662" r:id="rId2"/>
+    <p:sldLayoutId id="2147483663" r:id="rId3"/>
+    <p:sldLayoutId id="2147483664" r:id="rId4"/>
+    <p:sldLayoutId id="2147483665" r:id="rId5"/>
+    <p:sldLayoutId id="2147483666" r:id="rId6"/>
+    <p:sldLayoutId id="2147483667" r:id="rId7"/>
+    <p:sldLayoutId id="2147483668" r:id="rId8"/>
+    <p:sldLayoutId id="2147483669" r:id="rId9"/>
+    <p:sldLayoutId id="2147483670" r:id="rId10"/>
+    <p:sldLayoutId id="2147483671" r:id="rId11"/>
   </p:sldLayoutIdLst>
   <p:txStyles>
     <p:titleStyle>
-      <a:lvl1pPr algn="l" defTabSz="914400" rtl="0" eaLnBrk="1" latinLnBrk="0" hangingPunct="1">
+      <a:lvl1pPr algn="l" defTabSz="914400" rtl="1" eaLnBrk="1" latinLnBrk="0" hangingPunct="1">
         <a:lnSpc>
           <a:spcPct val="90000"/>
         </a:lnSpc>
@@ -4008,7 +3673,7 @@
       </a:lvl1pPr>
     </p:titleStyle>
     <p:bodyStyle>
-      <a:lvl1pPr marL="228600" indent="-228600" algn="l" defTabSz="914400" rtl="0" eaLnBrk="1" latinLnBrk="0" hangingPunct="1">
+      <a:lvl1pPr marL="228600" indent="-228600" algn="r" defTabSz="914400" rtl="1" eaLnBrk="1" latinLnBrk="0" hangingPunct="1">
         <a:lnSpc>
           <a:spcPct val="90000"/>
         </a:lnSpc>
@@ -4026,7 +3691,7 @@
           <a:cs typeface="+mn-cs"/>
         </a:defRPr>
       </a:lvl1pPr>
-      <a:lvl2pPr marL="685800" indent="-228600" algn="l" defTabSz="914400" rtl="0" eaLnBrk="1" latinLnBrk="0" hangingPunct="1">
+      <a:lvl2pPr marL="685800" indent="-228600" algn="r" defTabSz="914400" rtl="1" eaLnBrk="1" latinLnBrk="0" hangingPunct="1">
         <a:lnSpc>
           <a:spcPct val="90000"/>
         </a:lnSpc>
@@ -4044,7 +3709,7 @@
           <a:cs typeface="+mn-cs"/>
         </a:defRPr>
       </a:lvl2pPr>
-      <a:lvl3pPr marL="1143000" indent="-228600" algn="l" defTabSz="914400" rtl="0" eaLnBrk="1" latinLnBrk="0" hangingPunct="1">
+      <a:lvl3pPr marL="1143000" indent="-228600" algn="r" defTabSz="914400" rtl="1" eaLnBrk="1" latinLnBrk="0" hangingPunct="1">
         <a:lnSpc>
           <a:spcPct val="90000"/>
         </a:lnSpc>
@@ -4062,7 +3727,7 @@
           <a:cs typeface="+mn-cs"/>
         </a:defRPr>
       </a:lvl3pPr>
-      <a:lvl4pPr marL="1600200" indent="-228600" algn="l" defTabSz="914400" rtl="0" eaLnBrk="1" latinLnBrk="0" hangingPunct="1">
+      <a:lvl4pPr marL="1600200" indent="-228600" algn="r" defTabSz="914400" rtl="1" eaLnBrk="1" latinLnBrk="0" hangingPunct="1">
         <a:lnSpc>
           <a:spcPct val="90000"/>
         </a:lnSpc>
@@ -4080,7 +3745,7 @@
           <a:cs typeface="+mn-cs"/>
         </a:defRPr>
       </a:lvl4pPr>
-      <a:lvl5pPr marL="2057400" indent="-228600" algn="l" defTabSz="914400" rtl="0" eaLnBrk="1" latinLnBrk="0" hangingPunct="1">
+      <a:lvl5pPr marL="2057400" indent="-228600" algn="r" defTabSz="914400" rtl="1" eaLnBrk="1" latinLnBrk="0" hangingPunct="1">
         <a:lnSpc>
           <a:spcPct val="90000"/>
         </a:lnSpc>
@@ -4098,7 +3763,7 @@
           <a:cs typeface="+mn-cs"/>
         </a:defRPr>
       </a:lvl5pPr>
-      <a:lvl6pPr marL="2514600" indent="-228600" algn="l" defTabSz="914400" rtl="0" eaLnBrk="1" latinLnBrk="0" hangingPunct="1">
+      <a:lvl6pPr marL="2514600" indent="-228600" algn="r" defTabSz="914400" rtl="1" eaLnBrk="1" latinLnBrk="0" hangingPunct="1">
         <a:lnSpc>
           <a:spcPct val="90000"/>
         </a:lnSpc>
@@ -4116,7 +3781,7 @@
           <a:cs typeface="+mn-cs"/>
         </a:defRPr>
       </a:lvl6pPr>
-      <a:lvl7pPr marL="2971800" indent="-228600" algn="l" defTabSz="914400" rtl="0" eaLnBrk="1" latinLnBrk="0" hangingPunct="1">
+      <a:lvl7pPr marL="2971800" indent="-228600" algn="r" defTabSz="914400" rtl="1" eaLnBrk="1" latinLnBrk="0" hangingPunct="1">
         <a:lnSpc>
           <a:spcPct val="90000"/>
         </a:lnSpc>
@@ -4134,7 +3799,7 @@
           <a:cs typeface="+mn-cs"/>
         </a:defRPr>
       </a:lvl7pPr>
-      <a:lvl8pPr marL="3429000" indent="-228600" algn="l" defTabSz="914400" rtl="0" eaLnBrk="1" latinLnBrk="0" hangingPunct="1">
+      <a:lvl8pPr marL="3429000" indent="-228600" algn="r" defTabSz="914400" rtl="1" eaLnBrk="1" latinLnBrk="0" hangingPunct="1">
         <a:lnSpc>
           <a:spcPct val="90000"/>
         </a:lnSpc>
@@ -4152,7 +3817,7 @@
           <a:cs typeface="+mn-cs"/>
         </a:defRPr>
       </a:lvl8pPr>
-      <a:lvl9pPr marL="3886200" indent="-228600" algn="l" defTabSz="914400" rtl="0" eaLnBrk="1" latinLnBrk="0" hangingPunct="1">
+      <a:lvl9pPr marL="3886200" indent="-228600" algn="r" defTabSz="914400" rtl="1" eaLnBrk="1" latinLnBrk="0" hangingPunct="1">
         <a:lnSpc>
           <a:spcPct val="90000"/>
         </a:lnSpc>
@@ -4175,7 +3840,7 @@
       <a:defPPr>
         <a:defRPr lang="en-US"/>
       </a:defPPr>
-      <a:lvl1pPr marL="0" algn="l" defTabSz="914400" rtl="0" eaLnBrk="1" latinLnBrk="0" hangingPunct="1">
+      <a:lvl1pPr marL="0" algn="r" defTabSz="914400" rtl="1" eaLnBrk="1" latinLnBrk="0" hangingPunct="1">
         <a:defRPr sz="1800" kern="1200">
           <a:solidFill>
             <a:schemeClr val="tx1"/>
@@ -4185,7 +3850,7 @@
           <a:cs typeface="+mn-cs"/>
         </a:defRPr>
       </a:lvl1pPr>
-      <a:lvl2pPr marL="457200" algn="l" defTabSz="914400" rtl="0" eaLnBrk="1" latinLnBrk="0" hangingPunct="1">
+      <a:lvl2pPr marL="457200" algn="r" defTabSz="914400" rtl="1" eaLnBrk="1" latinLnBrk="0" hangingPunct="1">
         <a:defRPr sz="1800" kern="1200">
           <a:solidFill>
             <a:schemeClr val="tx1"/>
@@ -4195,7 +3860,7 @@
           <a:cs typeface="+mn-cs"/>
         </a:defRPr>
       </a:lvl2pPr>
-      <a:lvl3pPr marL="914400" algn="l" defTabSz="914400" rtl="0" eaLnBrk="1" latinLnBrk="0" hangingPunct="1">
+      <a:lvl3pPr marL="914400" algn="r" defTabSz="914400" rtl="1" eaLnBrk="1" latinLnBrk="0" hangingPunct="1">
         <a:defRPr sz="1800" kern="1200">
           <a:solidFill>
             <a:schemeClr val="tx1"/>
@@ -4205,7 +3870,7 @@
           <a:cs typeface="+mn-cs"/>
         </a:defRPr>
       </a:lvl3pPr>
-      <a:lvl4pPr marL="1371600" algn="l" defTabSz="914400" rtl="0" eaLnBrk="1" latinLnBrk="0" hangingPunct="1">
+      <a:lvl4pPr marL="1371600" algn="r" defTabSz="914400" rtl="1" eaLnBrk="1" latinLnBrk="0" hangingPunct="1">
         <a:defRPr sz="1800" kern="1200">
           <a:solidFill>
             <a:schemeClr val="tx1"/>
@@ -4215,7 +3880,7 @@
           <a:cs typeface="+mn-cs"/>
         </a:defRPr>
       </a:lvl4pPr>
-      <a:lvl5pPr marL="1828800" algn="l" defTabSz="914400" rtl="0" eaLnBrk="1" latinLnBrk="0" hangingPunct="1">
+      <a:lvl5pPr marL="1828800" algn="r" defTabSz="914400" rtl="1" eaLnBrk="1" latinLnBrk="0" hangingPunct="1">
         <a:defRPr sz="1800" kern="1200">
           <a:solidFill>
             <a:schemeClr val="tx1"/>
@@ -4225,7 +3890,7 @@
           <a:cs typeface="+mn-cs"/>
         </a:defRPr>
       </a:lvl5pPr>
-      <a:lvl6pPr marL="2286000" algn="l" defTabSz="914400" rtl="0" eaLnBrk="1" latinLnBrk="0" hangingPunct="1">
+      <a:lvl6pPr marL="2286000" algn="r" defTabSz="914400" rtl="1" eaLnBrk="1" latinLnBrk="0" hangingPunct="1">
         <a:defRPr sz="1800" kern="1200">
           <a:solidFill>
             <a:schemeClr val="tx1"/>
@@ -4235,7 +3900,7 @@
           <a:cs typeface="+mn-cs"/>
         </a:defRPr>
       </a:lvl6pPr>
-      <a:lvl7pPr marL="2743200" algn="l" defTabSz="914400" rtl="0" eaLnBrk="1" latinLnBrk="0" hangingPunct="1">
+      <a:lvl7pPr marL="2743200" algn="r" defTabSz="914400" rtl="1" eaLnBrk="1" latinLnBrk="0" hangingPunct="1">
         <a:defRPr sz="1800" kern="1200">
           <a:solidFill>
             <a:schemeClr val="tx1"/>
@@ -4245,7 +3910,7 @@
           <a:cs typeface="+mn-cs"/>
         </a:defRPr>
       </a:lvl7pPr>
-      <a:lvl8pPr marL="3200400" algn="l" defTabSz="914400" rtl="0" eaLnBrk="1" latinLnBrk="0" hangingPunct="1">
+      <a:lvl8pPr marL="3200400" algn="r" defTabSz="914400" rtl="1" eaLnBrk="1" latinLnBrk="0" hangingPunct="1">
         <a:defRPr sz="1800" kern="1200">
           <a:solidFill>
             <a:schemeClr val="tx1"/>
@@ -4255,7 +3920,7 @@
           <a:cs typeface="+mn-cs"/>
         </a:defRPr>
       </a:lvl8pPr>
-      <a:lvl9pPr marL="3657600" algn="l" defTabSz="914400" rtl="0" eaLnBrk="1" latinLnBrk="0" hangingPunct="1">
+      <a:lvl9pPr marL="3657600" algn="r" defTabSz="914400" rtl="1" eaLnBrk="1" latinLnBrk="0" hangingPunct="1">
         <a:defRPr sz="1800" kern="1200">
           <a:solidFill>
             <a:schemeClr val="tx1"/>
@@ -4305,7 +3970,9 @@
         </p:nvSpPr>
         <p:spPr/>
         <p:txBody>
-          <a:bodyPr/>
+          <a:bodyPr>
+            <a:normAutofit fontScale="90000"/>
+          </a:bodyPr>
           <a:lstStyle/>
           <a:p>
             <a:r>
@@ -4395,8 +4062,8 @@
         </p:blipFill>
         <p:spPr bwMode="auto">
           <a:xfrm>
-            <a:off x="9737652" y="4272925"/>
-            <a:ext cx="1921876" cy="1283813"/>
+            <a:off x="6935818" y="371310"/>
+            <a:ext cx="1949506" cy="1302270"/>
           </a:xfrm>
           <a:prstGeom prst="rect">
             <a:avLst/>
@@ -4441,8 +4108,8 @@
         </p:blipFill>
         <p:spPr>
           <a:xfrm>
-            <a:off x="33063" y="4272925"/>
-            <a:ext cx="1909056" cy="1299219"/>
+            <a:off x="130305" y="371310"/>
+            <a:ext cx="1754039" cy="1193721"/>
           </a:xfrm>
           <a:prstGeom prst="rect">
             <a:avLst/>
@@ -4477,8 +4144,8 @@
         </p:blipFill>
         <p:spPr>
           <a:xfrm>
-            <a:off x="1709797" y="5142200"/>
-            <a:ext cx="1392993" cy="1392993"/>
+            <a:off x="1282348" y="4713900"/>
+            <a:ext cx="1044745" cy="1044745"/>
           </a:xfrm>
           <a:prstGeom prst="rect">
             <a:avLst/>
@@ -4512,8 +4179,8 @@
         </p:blipFill>
         <p:spPr>
           <a:xfrm>
-            <a:off x="4114066" y="5181748"/>
-            <a:ext cx="1873091" cy="1354294"/>
+            <a:off x="3085550" y="4743561"/>
+            <a:ext cx="1404818" cy="1015721"/>
           </a:xfrm>
           <a:prstGeom prst="rect">
             <a:avLst/>
@@ -4548,8 +4215,8 @@
         </p:blipFill>
         <p:spPr>
           <a:xfrm>
-            <a:off x="5914844" y="5179937"/>
-            <a:ext cx="1354295" cy="1354295"/>
+            <a:off x="4436134" y="4742203"/>
+            <a:ext cx="1015721" cy="1015721"/>
           </a:xfrm>
           <a:prstGeom prst="rect">
             <a:avLst/>
@@ -4583,8 +4250,8 @@
         </p:blipFill>
         <p:spPr>
           <a:xfrm>
-            <a:off x="8502123" y="5147748"/>
-            <a:ext cx="1093230" cy="1381898"/>
+            <a:off x="6376592" y="4718061"/>
+            <a:ext cx="819923" cy="1036424"/>
           </a:xfrm>
           <a:prstGeom prst="rect">
             <a:avLst/>
@@ -4618,8 +4285,8 @@
         </p:blipFill>
         <p:spPr>
           <a:xfrm>
-            <a:off x="7147828" y="5061217"/>
-            <a:ext cx="1323705" cy="1473015"/>
+            <a:off x="5360871" y="4653163"/>
+            <a:ext cx="992779" cy="1104761"/>
           </a:xfrm>
           <a:prstGeom prst="rect">
             <a:avLst/>
@@ -4654,8 +4321,8 @@
         </p:blipFill>
         <p:spPr>
           <a:xfrm>
-            <a:off x="3102790" y="5167051"/>
-            <a:ext cx="1274251" cy="1368143"/>
+            <a:off x="2327093" y="4732539"/>
+            <a:ext cx="955688" cy="1026107"/>
           </a:xfrm>
           <a:prstGeom prst="rect">
             <a:avLst/>
@@ -4747,11 +4414,11 @@
         <p:spPr/>
         <p:txBody>
           <a:bodyPr>
-            <a:normAutofit lnSpcReduction="10000"/>
+            <a:normAutofit fontScale="92500" lnSpcReduction="10000"/>
           </a:bodyPr>
           <a:lstStyle/>
           <a:p>
-            <a:pPr marL="457200" indent="-457200">
+            <a:pPr marL="342900" indent="-342900" algn="l" rtl="0">
               <a:buFont typeface="+mj-lt"/>
               <a:buAutoNum type="arabicPeriod"/>
             </a:pPr>
@@ -4786,7 +4453,7 @@
             </a:r>
           </a:p>
           <a:p>
-            <a:pPr marL="0" indent="0">
+            <a:pPr marL="0" indent="0" algn="l" rtl="0">
               <a:buNone/>
             </a:pPr>
             <a:r>
@@ -4803,7 +4470,7 @@
             </a:r>
           </a:p>
           <a:p>
-            <a:pPr marL="457200" indent="-457200">
+            <a:pPr marL="342900" indent="-342900" algn="l" rtl="0">
               <a:buFont typeface="+mj-lt"/>
               <a:buAutoNum type="arabicPeriod" startAt="2"/>
             </a:pPr>
@@ -4838,7 +4505,7 @@
             </a:r>
           </a:p>
           <a:p>
-            <a:pPr marL="0" indent="0">
+            <a:pPr marL="0" indent="0" algn="l" rtl="0">
               <a:buNone/>
             </a:pPr>
             <a:r>
@@ -4866,7 +4533,7 @@
               <a:t>consistency </a:t>
             </a:r>
             <a:r>
-              <a:rPr lang="en-US" sz="2000" dirty="0">
+              <a:rPr lang="en-US" sz="2200" dirty="0">
                 <a:solidFill>
                   <a:schemeClr val="bg1">
                     <a:lumMod val="50000"/>
@@ -4876,7 +4543,7 @@
               <a:t>[</a:t>
             </a:r>
             <a:r>
-              <a:rPr lang="en-US" sz="2000" dirty="0" err="1">
+              <a:rPr lang="en-US" sz="2200" dirty="0" err="1">
                 <a:solidFill>
                   <a:schemeClr val="bg1">
                     <a:lumMod val="50000"/>
@@ -4886,7 +4553,7 @@
               <a:t>Henzinger</a:t>
             </a:r>
             <a:r>
-              <a:rPr lang="en-US" sz="2000" dirty="0">
+              <a:rPr lang="en-US" sz="2200" dirty="0">
                 <a:solidFill>
                   <a:schemeClr val="bg1">
                     <a:lumMod val="50000"/>
@@ -4895,7 +4562,7 @@
               </a:rPr>
               <a:t> et al. 2013] </a:t>
             </a:r>
-            <a:endParaRPr lang="en-US" sz="2000" dirty="0" smtClean="0">
+            <a:endParaRPr lang="en-US" sz="2200" dirty="0">
               <a:solidFill>
                 <a:schemeClr val="bg1">
                   <a:lumMod val="50000"/>
@@ -4904,7 +4571,7 @@
             </a:endParaRPr>
           </a:p>
           <a:p>
-            <a:pPr marL="0" indent="0">
+            <a:pPr marL="0" indent="0" algn="l" rtl="0">
               <a:buNone/>
             </a:pPr>
             <a:r>
@@ -4922,7 +4589,7 @@
             <a:endParaRPr lang="en-US" dirty="0"/>
           </a:p>
           <a:p>
-            <a:pPr marL="457200" indent="-457200">
+            <a:pPr marL="342900" indent="-342900" algn="l" rtl="0">
               <a:buFont typeface="+mj-lt"/>
               <a:buAutoNum type="arabicPeriod" startAt="3"/>
             </a:pPr>
@@ -4938,7 +4605,7 @@
             </a:r>
           </a:p>
           <a:p>
-            <a:pPr marL="0" indent="0">
+            <a:pPr marL="0" indent="0" algn="l" rtl="0">
               <a:buNone/>
             </a:pPr>
             <a:r>
@@ -4970,7 +4637,7 @@
               <a:t>linearizability </a:t>
             </a:r>
             <a:r>
-              <a:rPr lang="en-US" sz="2000" dirty="0">
+              <a:rPr lang="en-US" sz="2200" dirty="0">
                 <a:solidFill>
                   <a:schemeClr val="bg1">
                     <a:lumMod val="50000"/>
@@ -4979,21 +4646,21 @@
               </a:rPr>
               <a:t>[Golab et al. 2011] </a:t>
             </a:r>
-            <a:endParaRPr lang="en-US" sz="2000" dirty="0">
+            <a:endParaRPr lang="en-US" sz="2200" dirty="0">
               <a:solidFill>
                 <a:srgbClr val="0565A7"/>
               </a:solidFill>
             </a:endParaRPr>
           </a:p>
           <a:p>
-            <a:pPr marL="457200" indent="-457200">
+            <a:pPr marL="342900" indent="-342900" algn="l" rtl="0">
               <a:buFont typeface="+mj-lt"/>
               <a:buAutoNum type="arabicPeriod" startAt="3"/>
             </a:pPr>
             <a:endParaRPr lang="en-US" dirty="0"/>
           </a:p>
           <a:p>
-            <a:pPr marL="457200" indent="-457200">
+            <a:pPr marL="342900" indent="-342900" algn="l" rtl="0">
               <a:buFont typeface="+mj-lt"/>
               <a:buAutoNum type="arabicPeriod" startAt="3"/>
             </a:pPr>
@@ -5457,8 +5124,8 @@
         </p:blipFill>
         <p:spPr>
           <a:xfrm>
-            <a:off x="7032104" y="2492896"/>
-            <a:ext cx="3384377" cy="4953000"/>
+            <a:off x="5556739" y="3359969"/>
+            <a:ext cx="2185284" cy="3198140"/>
           </a:xfrm>
           <a:prstGeom prst="rect">
             <a:avLst/>
@@ -5492,8 +5159,8 @@
         </p:blipFill>
         <p:spPr>
           <a:xfrm rot="15696024">
-            <a:off x="4960987" y="5316385"/>
-            <a:ext cx="411924" cy="535745"/>
+            <a:off x="4450502" y="5336905"/>
+            <a:ext cx="308943" cy="401809"/>
           </a:xfrm>
           <a:prstGeom prst="rect">
             <a:avLst/>
@@ -5540,6 +5207,7 @@
           </a:bodyPr>
           <a:lstStyle/>
           <a:p>
+            <a:pPr algn="l" rtl="0"/>
             <a:r>
               <a:rPr lang="en-US" dirty="0"/>
               <a:t>Generic solution based on </a:t>
@@ -5558,7 +5226,7 @@
             </a:r>
           </a:p>
           <a:p>
-            <a:pPr lvl="1"/>
+            <a:pPr lvl="1" algn="l" rtl="0"/>
             <a:r>
               <a:rPr lang="en-US" dirty="0"/>
               <a:t>Rigorous correctness proof using </a:t>
@@ -5573,6 +5241,7 @@
             </a:r>
           </a:p>
           <a:p>
+            <a:pPr algn="l" rtl="0"/>
             <a:r>
               <a:rPr lang="en-US" dirty="0"/>
               <a:t>High ingestion </a:t>
@@ -5591,13 +5260,14 @@
             </a:r>
           </a:p>
           <a:p>
-            <a:pPr lvl="1"/>
+            <a:pPr lvl="1" algn="l" rtl="0"/>
             <a:r>
               <a:rPr lang="en-US" dirty="0"/>
               <a:t>Harness multi-cores </a:t>
             </a:r>
           </a:p>
           <a:p>
+            <a:pPr algn="l" rtl="0"/>
             <a:r>
               <a:rPr lang="en-US" dirty="0"/>
               <a:t>Query </a:t>
@@ -5612,13 +5282,14 @@
             </a:r>
           </a:p>
           <a:p>
-            <a:pPr lvl="1"/>
+            <a:pPr lvl="1" algn="l" rtl="0"/>
             <a:r>
               <a:rPr lang="en-US" dirty="0"/>
               <a:t>Allow queries during updates</a:t>
             </a:r>
           </a:p>
           <a:p>
+            <a:pPr algn="l" rtl="0"/>
             <a:r>
               <a:rPr lang="en-US" dirty="0" smtClean="0"/>
               <a:t>Enjoy </a:t>
@@ -5629,32 +5300,32 @@
             </a:r>
           </a:p>
           <a:p>
-            <a:pPr lvl="1"/>
+            <a:pPr lvl="1" algn="l" rtl="0"/>
             <a:r>
               <a:rPr lang="en-US" dirty="0"/>
               <a:t>Fast</a:t>
             </a:r>
           </a:p>
           <a:p>
-            <a:pPr lvl="1"/>
+            <a:pPr lvl="1" algn="l" rtl="0"/>
             <a:r>
               <a:rPr lang="en-US" dirty="0"/>
               <a:t>Bounded estimation error</a:t>
             </a:r>
           </a:p>
           <a:p>
-            <a:pPr lvl="1"/>
+            <a:pPr lvl="1" algn="l" rtl="0"/>
             <a:r>
               <a:rPr lang="en-US" dirty="0"/>
               <a:t>Small memory footprint</a:t>
             </a:r>
           </a:p>
           <a:p>
-            <a:pPr lvl="1"/>
+            <a:pPr lvl="1" algn="l" rtl="0"/>
             <a:endParaRPr lang="en-US" dirty="0"/>
           </a:p>
           <a:p>
-            <a:pPr lvl="1"/>
+            <a:pPr lvl="1" algn="l" rtl="0"/>
             <a:endParaRPr lang="en-US" dirty="0"/>
           </a:p>
         </p:txBody>
@@ -5697,8 +5368,8 @@
         </p:nvSpPr>
         <p:spPr>
           <a:xfrm>
-            <a:off x="8976320" y="3645024"/>
-            <a:ext cx="1584176" cy="864096"/>
+            <a:off x="7552304" y="3655876"/>
+            <a:ext cx="1349710" cy="690835"/>
           </a:xfrm>
           <a:prstGeom prst="wedgeEllipseCallout">
             <a:avLst>
@@ -5729,18 +5400,18 @@
           <a:p>
             <a:pPr algn="ctr"/>
             <a:r>
-              <a:rPr lang="en-US" sz="2000" dirty="0"/>
+              <a:rPr lang="en-US" sz="1500" dirty="0"/>
               <a:t>Now</a:t>
             </a:r>
             <a:r>
-              <a:rPr lang="en-US" dirty="0"/>
+              <a:rPr lang="en-US" sz="1350" dirty="0"/>
               <a:t> </a:t>
             </a:r>
             <a:r>
-              <a:rPr lang="en-US" sz="2000" dirty="0"/>
+              <a:rPr lang="en-US" sz="1500" dirty="0"/>
               <a:t>Available</a:t>
             </a:r>
-            <a:endParaRPr lang="en-IL" dirty="0"/>
+            <a:endParaRPr lang="en-IL" sz="1350" dirty="0"/>
           </a:p>
         </p:txBody>
       </p:sp>
@@ -5828,8 +5499,8 @@
         </p:nvSpPr>
         <p:spPr>
           <a:xfrm>
-            <a:off x="2152650" y="1825625"/>
-            <a:ext cx="3886200" cy="4351338"/>
+            <a:off x="1614488" y="2226469"/>
+            <a:ext cx="2914650" cy="3263504"/>
           </a:xfrm>
         </p:spPr>
         <p:txBody>
@@ -5851,35 +5522,6 @@
               <a:buNone/>
             </a:pPr>
             <a:endParaRPr lang="en-US" b="1" dirty="0"/>
-          </a:p>
-        </p:txBody>
-      </p:sp>
-      <p:sp>
-        <p:nvSpPr>
-          <p:cNvPr id="4" name="Slide Number Placeholder 3">
-            <a:extLst>
-              <a:ext uri="{FF2B5EF4-FFF2-40B4-BE49-F238E27FC236}">
-                <a16:creationId xmlns:a16="http://schemas.microsoft.com/office/drawing/2014/main" id="{EBCBC6C0-76DF-454C-AB50-E4FE1F3CE4D2}"/>
-              </a:ext>
-            </a:extLst>
-          </p:cNvPr>
-          <p:cNvSpPr>
-            <a:spLocks noGrp="1"/>
-          </p:cNvSpPr>
-          <p:nvPr>
-            <p:ph type="sldNum" sz="quarter" idx="12"/>
-          </p:nvPr>
-        </p:nvSpPr>
-        <p:spPr/>
-        <p:txBody>
-          <a:bodyPr/>
-          <a:lstStyle/>
-          <a:p>
-            <a:fld id="{F742C4D0-E0C3-49C3-B08F-747C00997521}" type="slidenum">
-              <a:rPr lang="en-US" smtClean="0"/>
-              <a:t>12</a:t>
-            </a:fld>
-            <a:endParaRPr lang="en-US"/>
           </a:p>
         </p:txBody>
       </p:sp>
@@ -5909,8 +5551,8 @@
         </p:blipFill>
         <p:spPr>
           <a:xfrm>
-            <a:off x="5879976" y="2708920"/>
-            <a:ext cx="4159374" cy="2646982"/>
+            <a:off x="4409982" y="2888940"/>
+            <a:ext cx="3119531" cy="1985237"/>
           </a:xfrm>
           <a:prstGeom prst="rect">
             <a:avLst/>
@@ -5923,6 +5565,35 @@
       </p:pic>
       <p:sp>
         <p:nvSpPr>
+          <p:cNvPr id="4" name="Slide Number Placeholder 3">
+            <a:extLst>
+              <a:ext uri="{FF2B5EF4-FFF2-40B4-BE49-F238E27FC236}">
+                <a16:creationId xmlns:a16="http://schemas.microsoft.com/office/drawing/2014/main" id="{EBCBC6C0-76DF-454C-AB50-E4FE1F3CE4D2}"/>
+              </a:ext>
+            </a:extLst>
+          </p:cNvPr>
+          <p:cNvSpPr>
+            <a:spLocks noGrp="1"/>
+          </p:cNvSpPr>
+          <p:nvPr>
+            <p:ph type="sldNum" sz="quarter" idx="12"/>
+          </p:nvPr>
+        </p:nvSpPr>
+        <p:spPr/>
+        <p:txBody>
+          <a:bodyPr/>
+          <a:lstStyle/>
+          <a:p>
+            <a:fld id="{F742C4D0-E0C3-49C3-B08F-747C00997521}" type="slidenum">
+              <a:rPr lang="en-US" smtClean="0"/>
+              <a:t>12</a:t>
+            </a:fld>
+            <a:endParaRPr lang="en-US"/>
+          </a:p>
+        </p:txBody>
+      </p:sp>
+      <p:sp>
+        <p:nvSpPr>
           <p:cNvPr id="16" name="Content Placeholder 4">
             <a:extLst>
               <a:ext uri="{FF2B5EF4-FFF2-40B4-BE49-F238E27FC236}">
@@ -5937,15 +5608,15 @@
         </p:nvSpPr>
         <p:spPr>
           <a:xfrm>
-            <a:off x="6023992" y="1813966"/>
-            <a:ext cx="3886200" cy="4351338"/>
+            <a:off x="4517994" y="2217724"/>
+            <a:ext cx="2914650" cy="3263504"/>
           </a:xfrm>
           <a:prstGeom prst="rect">
             <a:avLst/>
           </a:prstGeom>
         </p:spPr>
         <p:txBody>
-          <a:bodyPr vert="horz" lIns="91440" tIns="45720" rIns="91440" bIns="45720" rtlCol="0">
+          <a:bodyPr vert="horz" lIns="68580" tIns="34290" rIns="68580" bIns="34290" rtlCol="0">
             <a:normAutofit/>
           </a:bodyPr>
           <a:lstStyle>
@@ -6117,10 +5788,10 @@
               <a:buNone/>
             </a:pPr>
             <a:r>
-              <a:rPr lang="en-US" dirty="0"/>
+              <a:rPr lang="en-US" sz="1800" dirty="0"/>
               <a:t>But locks are costly: </a:t>
             </a:r>
-            <a:endParaRPr lang="en-IL" dirty="0"/>
+            <a:endParaRPr lang="en-IL" sz="1800" dirty="0"/>
           </a:p>
         </p:txBody>
       </p:sp>
@@ -6140,8 +5811,8 @@
         </p:blipFill>
         <p:spPr>
           <a:xfrm>
-            <a:off x="2152650" y="2708920"/>
-            <a:ext cx="2837819" cy="2837819"/>
+            <a:off x="1614488" y="2888941"/>
+            <a:ext cx="2128364" cy="2128364"/>
           </a:xfrm>
           <a:prstGeom prst="rect">
             <a:avLst/>
@@ -6158,11 +5829,11 @@
   <p:clrMapOvr>
     <a:masterClrMapping/>
   </p:clrMapOvr>
-  <mc:AlternateContent xmlns:mc="http://schemas.openxmlformats.org/markup-compatibility/2006">
-    <mc:Choice xmlns:p14="http://schemas.microsoft.com/office/powerpoint/2010/main" Requires="p14">
+  <mc:AlternateContent xmlns:mc="http://schemas.openxmlformats.org/markup-compatibility/2006" xmlns:p14="http://schemas.microsoft.com/office/powerpoint/2010/main">
+    <mc:Choice Requires="p14">
       <p:transition spd="slow" p14:dur="2000"/>
     </mc:Choice>
-    <mc:Fallback>
+    <mc:Fallback xmlns="">
       <p:transition spd="slow"/>
     </mc:Fallback>
   </mc:AlternateContent>
@@ -6338,8 +6009,8 @@
         </p:nvSpPr>
         <p:spPr>
           <a:xfrm>
-            <a:off x="928515" y="1690688"/>
-            <a:ext cx="7005831" cy="4351338"/>
+            <a:off x="696387" y="2125266"/>
+            <a:ext cx="5254373" cy="3263504"/>
           </a:xfrm>
         </p:spPr>
         <p:txBody>
@@ -6406,8 +6077,8 @@
         </p:nvGrpSpPr>
         <p:grpSpPr>
           <a:xfrm>
-            <a:off x="2346395" y="1812247"/>
-            <a:ext cx="7763560" cy="4498179"/>
+            <a:off x="1759796" y="2216436"/>
+            <a:ext cx="5822670" cy="3373634"/>
             <a:chOff x="2346395" y="1812247"/>
             <a:chExt cx="7763560" cy="4498179"/>
           </a:xfrm>
@@ -6449,16 +6120,16 @@
             </a:ln>
           </p:spPr>
           <p:txBody>
-            <a:bodyPr lIns="91425" tIns="91425" rIns="91425" bIns="91425" anchor="ctr" anchorCtr="0">
+            <a:bodyPr lIns="68569" tIns="68569" rIns="68569" bIns="68569" anchor="ctr" anchorCtr="0">
               <a:noAutofit/>
             </a:bodyPr>
             <a:lstStyle/>
             <a:p>
               <a:r>
-                <a:rPr lang="en-US" dirty="0"/>
+                <a:rPr lang="en-US" sz="1350" dirty="0"/>
                 <a:t>               update</a:t>
               </a:r>
-              <a:endParaRPr dirty="0"/>
+              <a:endParaRPr sz="1350" dirty="0"/>
             </a:p>
           </p:txBody>
         </p:sp>
@@ -6499,24 +6170,24 @@
             </a:ln>
           </p:spPr>
           <p:txBody>
-            <a:bodyPr lIns="91425" tIns="91425" rIns="91425" bIns="91425" anchor="ctr" anchorCtr="0">
+            <a:bodyPr lIns="68569" tIns="68569" rIns="68569" bIns="68569" anchor="ctr" anchorCtr="0">
               <a:noAutofit/>
             </a:bodyPr>
             <a:lstStyle/>
             <a:p>
               <a:pPr algn="ctr"/>
               <a:r>
-                <a:rPr lang="en-US" dirty="0"/>
+                <a:rPr lang="en-US" sz="1350" dirty="0"/>
                 <a:t>Old</a:t>
               </a:r>
             </a:p>
             <a:p>
               <a:pPr algn="ctr"/>
               <a:r>
-                <a:rPr lang="en-US" dirty="0"/>
+                <a:rPr lang="en-US" sz="1350" dirty="0"/>
                 <a:t>Data Store</a:t>
               </a:r>
-              <a:endParaRPr dirty="0"/>
+              <a:endParaRPr sz="1350" dirty="0"/>
             </a:p>
           </p:txBody>
         </p:sp>
@@ -6580,14 +6251,14 @@
             </a:ln>
           </p:spPr>
           <p:txBody>
-            <a:bodyPr lIns="91425" tIns="91425" rIns="91425" bIns="91425" anchor="t" anchorCtr="0">
+            <a:bodyPr lIns="68569" tIns="68569" rIns="68569" bIns="68569" anchor="t" anchorCtr="0">
               <a:noAutofit/>
             </a:bodyPr>
             <a:lstStyle/>
             <a:p>
               <a:pPr algn="ctr"/>
               <a:r>
-                <a:rPr lang="en-US" dirty="0"/>
+                <a:rPr lang="en-US" sz="1350" dirty="0"/>
                 <a:t>query</a:t>
               </a:r>
             </a:p>
@@ -6645,7 +6316,7 @@
             <a:lstStyle/>
             <a:p>
               <a:pPr algn="ctr"/>
-              <a:endParaRPr lang="en-US" sz="1600" dirty="0" err="1">
+              <a:endParaRPr lang="en-US" sz="1200" dirty="0" err="1">
                 <a:solidFill>
                   <a:schemeClr val="tx1"/>
                 </a:solidFill>
@@ -6692,24 +6363,24 @@
             </a:ln>
           </p:spPr>
           <p:txBody>
-            <a:bodyPr lIns="91425" tIns="91425" rIns="91425" bIns="91425" anchor="ctr" anchorCtr="0">
+            <a:bodyPr lIns="68569" tIns="68569" rIns="68569" bIns="68569" anchor="ctr" anchorCtr="0">
               <a:noAutofit/>
             </a:bodyPr>
             <a:lstStyle/>
             <a:p>
               <a:pPr algn="ctr"/>
               <a:r>
-                <a:rPr lang="en-US" dirty="0"/>
+                <a:rPr lang="en-US" sz="1350" dirty="0"/>
                 <a:t>New </a:t>
               </a:r>
             </a:p>
             <a:p>
               <a:pPr algn="ctr"/>
               <a:r>
-                <a:rPr lang="en-US" dirty="0"/>
+                <a:rPr lang="en-US" sz="1350" dirty="0"/>
                 <a:t>Data Store</a:t>
               </a:r>
-              <a:endParaRPr dirty="0"/>
+              <a:endParaRPr sz="1350" dirty="0"/>
             </a:p>
           </p:txBody>
         </p:sp>
@@ -6750,12 +6421,12 @@
             </a:ln>
           </p:spPr>
           <p:txBody>
-            <a:bodyPr lIns="91425" tIns="91425" rIns="91425" bIns="91425" anchor="ctr" anchorCtr="0">
+            <a:bodyPr lIns="68569" tIns="68569" rIns="68569" bIns="68569" anchor="ctr" anchorCtr="0">
               <a:noAutofit/>
             </a:bodyPr>
             <a:lstStyle/>
             <a:p>
-              <a:endParaRPr dirty="0"/>
+              <a:endParaRPr sz="1350" dirty="0"/>
             </a:p>
           </p:txBody>
         </p:sp>
@@ -6796,12 +6467,12 @@
             </a:ln>
           </p:spPr>
           <p:txBody>
-            <a:bodyPr lIns="91425" tIns="91425" rIns="91425" bIns="91425" anchor="ctr" anchorCtr="0">
+            <a:bodyPr lIns="68569" tIns="68569" rIns="68569" bIns="68569" anchor="ctr" anchorCtr="0">
               <a:noAutofit/>
             </a:bodyPr>
             <a:lstStyle/>
             <a:p>
-              <a:endParaRPr dirty="0"/>
+              <a:endParaRPr sz="1350" dirty="0"/>
             </a:p>
           </p:txBody>
         </p:sp>
@@ -6883,12 +6554,12 @@
             </a:ln>
           </p:spPr>
           <p:txBody>
-            <a:bodyPr lIns="91425" tIns="91425" rIns="91425" bIns="91425" anchor="ctr" anchorCtr="0">
+            <a:bodyPr lIns="68569" tIns="68569" rIns="68569" bIns="68569" anchor="ctr" anchorCtr="0">
               <a:noAutofit/>
             </a:bodyPr>
             <a:lstStyle/>
             <a:p>
-              <a:endParaRPr lang="en-US" dirty="0"/>
+              <a:endParaRPr lang="en-US" sz="1350" dirty="0"/>
             </a:p>
           </p:txBody>
         </p:sp>
@@ -7059,11 +6730,11 @@
   <p:clrMapOvr>
     <a:masterClrMapping/>
   </p:clrMapOvr>
-  <mc:AlternateContent xmlns:mc="http://schemas.openxmlformats.org/markup-compatibility/2006">
-    <mc:Choice xmlns:p14="http://schemas.microsoft.com/office/powerpoint/2010/main" Requires="p14">
+  <mc:AlternateContent xmlns:mc="http://schemas.openxmlformats.org/markup-compatibility/2006" xmlns:p14="http://schemas.microsoft.com/office/powerpoint/2010/main">
+    <mc:Choice Requires="p14">
       <p:transition spd="slow" p14:dur="2000"/>
     </mc:Choice>
-    <mc:Fallback>
+    <mc:Fallback xmlns="">
       <p:transition spd="slow"/>
     </mc:Fallback>
   </mc:AlternateContent>
@@ -7116,30 +6787,6 @@
           </a:p>
         </p:txBody>
       </p:sp>
-      <p:sp>
-        <p:nvSpPr>
-          <p:cNvPr id="3" name="Slide Number Placeholder 2"/>
-          <p:cNvSpPr>
-            <a:spLocks noGrp="1"/>
-          </p:cNvSpPr>
-          <p:nvPr>
-            <p:ph type="sldNum" sz="quarter" idx="12"/>
-          </p:nvPr>
-        </p:nvSpPr>
-        <p:spPr/>
-        <p:txBody>
-          <a:bodyPr/>
-          <a:lstStyle/>
-          <a:p>
-            <a:fld id="{99921478-9A63-450E-8942-C240FE31B1C1}" type="slidenum">
-              <a:rPr lang="en-US" smtClean="0"/>
-              <a:pPr/>
-              <a:t>2</a:t>
-            </a:fld>
-            <a:endParaRPr lang="en-US"/>
-          </a:p>
-        </p:txBody>
-      </p:sp>
       <p:pic>
         <p:nvPicPr>
           <p:cNvPr id="9" name="Content Placeholder 8">
@@ -7158,13 +6805,12 @@
         </p:nvPicPr>
         <p:blipFill rotWithShape="1">
           <a:blip r:embed="rId2" cstate="print"/>
-          <a:srcRect l="8914" t="8114" r="8914"/>
           <a:stretch/>
         </p:blipFill>
         <p:spPr>
           <a:xfrm>
-            <a:off x="1703513" y="1535671"/>
-            <a:ext cx="8928991" cy="5361345"/>
+            <a:off x="628650" y="1883831"/>
+            <a:ext cx="7886700" cy="4234925"/>
           </a:xfrm>
           <a:prstGeom prst="rect">
             <a:avLst/>
@@ -7176,14 +6822,38 @@
       </p:pic>
       <p:sp>
         <p:nvSpPr>
+          <p:cNvPr id="3" name="Slide Number Placeholder 2"/>
+          <p:cNvSpPr>
+            <a:spLocks noGrp="1"/>
+          </p:cNvSpPr>
+          <p:nvPr>
+            <p:ph type="sldNum" sz="quarter" idx="12"/>
+          </p:nvPr>
+        </p:nvSpPr>
+        <p:spPr/>
+        <p:txBody>
+          <a:bodyPr/>
+          <a:lstStyle/>
+          <a:p>
+            <a:fld id="{99921478-9A63-450E-8942-C240FE31B1C1}" type="slidenum">
+              <a:rPr lang="en-US" smtClean="0"/>
+              <a:pPr/>
+              <a:t>2</a:t>
+            </a:fld>
+            <a:endParaRPr lang="en-US"/>
+          </a:p>
+        </p:txBody>
+      </p:sp>
+      <p:sp>
+        <p:nvSpPr>
           <p:cNvPr id="12" name="Oval Callout 11"/>
           <p:cNvSpPr/>
           <p:nvPr/>
         </p:nvSpPr>
         <p:spPr>
           <a:xfrm>
-            <a:off x="6168007" y="1930644"/>
-            <a:ext cx="4089370" cy="1520596"/>
+            <a:off x="4626005" y="2305233"/>
+            <a:ext cx="3067028" cy="1140447"/>
           </a:xfrm>
           <a:prstGeom prst="wedgeEllipseCallout">
             <a:avLst>
@@ -7224,7 +6894,7 @@
           <a:p>
             <a:pPr algn="ctr"/>
             <a:r>
-              <a:rPr lang="en-US" sz="2000" dirty="0">
+              <a:rPr lang="en-US" sz="1500" dirty="0">
                 <a:solidFill>
                   <a:schemeClr val="tx1"/>
                 </a:solidFill>
@@ -7232,14 +6902,14 @@
               <a:t>Real-time reports</a:t>
             </a:r>
             <a:br>
-              <a:rPr lang="en-US" sz="2000" dirty="0">
+              <a:rPr lang="en-US" sz="1500" dirty="0">
                 <a:solidFill>
                   <a:schemeClr val="tx1"/>
                 </a:solidFill>
               </a:rPr>
             </a:br>
             <a:r>
-              <a:rPr lang="en-US" sz="2000" dirty="0">
+              <a:rPr lang="en-US" sz="1500" dirty="0">
                 <a:solidFill>
                   <a:schemeClr val="tx1"/>
                 </a:solidFill>
@@ -7340,36 +7010,40 @@
           <a:bodyPr/>
           <a:lstStyle/>
           <a:p>
+            <a:pPr algn="l" rtl="0"/>
             <a:r>
               <a:rPr lang="en-US" dirty="0"/>
               <a:t>Multi-core servers</a:t>
             </a:r>
           </a:p>
           <a:p>
-            <a:pPr lvl="1"/>
+            <a:pPr lvl="1" algn="l" rtl="0"/>
             <a:r>
               <a:rPr lang="en-US" dirty="0"/>
-              <a:t>Performance via parallelism, not sequential speed</a:t>
-            </a:r>
-          </a:p>
-          <a:p>
+              <a:t>Performance via parallelism, not sequential </a:t>
+            </a:r>
+            <a:r>
+              <a:rPr lang="en-US" dirty="0" smtClean="0"/>
+              <a:t>speed</a:t>
+            </a:r>
             <a:endParaRPr lang="en-US" dirty="0"/>
           </a:p>
           <a:p>
+            <a:pPr algn="l" rtl="0"/>
             <a:r>
               <a:rPr lang="en-US" dirty="0"/>
               <a:t>Cheaper DRAM</a:t>
             </a:r>
           </a:p>
           <a:p>
-            <a:pPr lvl="1"/>
+            <a:pPr lvl="1" algn="l" rtl="0"/>
             <a:r>
               <a:rPr lang="en-US" dirty="0"/>
               <a:t>In-memory processing of bigger data</a:t>
             </a:r>
           </a:p>
           <a:p>
-            <a:pPr lvl="1"/>
+            <a:pPr lvl="1" algn="l" rtl="0"/>
             <a:endParaRPr lang="en-IL" dirty="0"/>
           </a:p>
         </p:txBody>
@@ -7433,8 +7107,8 @@
         </p:blipFill>
         <p:spPr bwMode="auto">
           <a:xfrm>
-            <a:off x="6960096" y="3573016"/>
-            <a:ext cx="3684240" cy="2736305"/>
+            <a:off x="2846149" y="4370918"/>
+            <a:ext cx="2763180" cy="2052229"/>
           </a:xfrm>
           <a:prstGeom prst="rect">
             <a:avLst/>
@@ -7465,8 +7139,8 @@
         </p:nvSpPr>
         <p:spPr>
           <a:xfrm>
-            <a:off x="7101482" y="3297573"/>
-            <a:ext cx="3420055" cy="646331"/>
+            <a:off x="2945218" y="3863087"/>
+            <a:ext cx="2565041" cy="507831"/>
           </a:xfrm>
           <a:prstGeom prst="rect">
             <a:avLst/>
@@ -7480,7 +7154,7 @@
           <a:p>
             <a:pPr fontAlgn="base"/>
             <a:r>
-              <a:rPr lang="en-US" b="1" dirty="0">
+              <a:rPr lang="en-US" sz="1350" b="1" dirty="0">
                 <a:solidFill>
                   <a:srgbClr val="444444"/>
                 </a:solidFill>
@@ -7492,7 +7166,7 @@
           <a:p>
             <a:pPr fontAlgn="base"/>
             <a:r>
-              <a:rPr lang="en-US" b="1" dirty="0">
+              <a:rPr lang="en-US" sz="1350" b="1" dirty="0">
                 <a:solidFill>
                   <a:srgbClr val="444444"/>
                 </a:solidFill>
@@ -7567,8 +7241,8 @@
         </p:blipFill>
         <p:spPr>
           <a:xfrm rot="17205444">
-            <a:off x="7572061" y="5381287"/>
-            <a:ext cx="505502" cy="657452"/>
+            <a:off x="6514315" y="4858047"/>
+            <a:ext cx="379127" cy="493089"/>
           </a:xfrm>
           <a:prstGeom prst="rect">
             <a:avLst/>
@@ -7613,24 +7287,28 @@
           <a:bodyPr/>
           <a:lstStyle/>
           <a:p>
+            <a:pPr algn="l" rtl="0"/>
             <a:r>
               <a:rPr lang="en-US" dirty="0"/>
               <a:t>Fast</a:t>
             </a:r>
           </a:p>
           <a:p>
+            <a:pPr algn="l" rtl="0"/>
             <a:r>
               <a:rPr lang="en-US" dirty="0"/>
               <a:t>Small memory footprint</a:t>
             </a:r>
           </a:p>
           <a:p>
+            <a:pPr algn="l" rtl="0"/>
             <a:r>
               <a:rPr lang="en-US" dirty="0"/>
               <a:t>Statistical summary of large stream</a:t>
             </a:r>
           </a:p>
           <a:p>
+            <a:pPr algn="l" rtl="0"/>
             <a:r>
               <a:rPr lang="en-US" dirty="0"/>
               <a:t>Estimates some </a:t>
@@ -7645,30 +7323,32 @@
             </a:r>
           </a:p>
           <a:p>
-            <a:pPr lvl="1"/>
+            <a:pPr lvl="1" algn="l" rtl="0"/>
             <a:r>
               <a:rPr lang="en-US" dirty="0"/>
               <a:t>#uniques </a:t>
             </a:r>
           </a:p>
           <a:p>
-            <a:pPr lvl="1"/>
+            <a:pPr lvl="1" algn="l" rtl="0"/>
             <a:r>
               <a:rPr lang="en-US" dirty="0"/>
               <a:t>quantiles</a:t>
             </a:r>
           </a:p>
           <a:p>
-            <a:pPr lvl="1"/>
+            <a:pPr lvl="1" algn="l" rtl="0"/>
             <a:r>
               <a:rPr lang="en-US" dirty="0"/>
               <a:t>heavy-hitters</a:t>
             </a:r>
           </a:p>
           <a:p>
+            <a:pPr algn="l" rtl="0"/>
             <a:endParaRPr lang="en-US" dirty="0"/>
           </a:p>
           <a:p>
+            <a:pPr algn="l" rtl="0"/>
             <a:endParaRPr lang="he-IL" dirty="0"/>
           </a:p>
         </p:txBody>
@@ -7693,7 +7373,7 @@
               <a:pPr/>
               <a:t>4</a:t>
             </a:fld>
-            <a:endParaRPr lang="en-US"/>
+            <a:endParaRPr lang="en-US" dirty="0"/>
           </a:p>
         </p:txBody>
       </p:sp>
@@ -7720,8 +7400,8 @@
         </p:blipFill>
         <p:spPr bwMode="auto">
           <a:xfrm>
-            <a:off x="6096000" y="1484785"/>
-            <a:ext cx="4824536" cy="4824536"/>
+            <a:off x="5525598" y="1870077"/>
+            <a:ext cx="3618402" cy="3618402"/>
           </a:xfrm>
           <a:prstGeom prst="rect">
             <a:avLst/>
@@ -7888,8 +7568,8 @@
         </p:blipFill>
         <p:spPr>
           <a:xfrm>
-            <a:off x="1631504" y="1768476"/>
-            <a:ext cx="9144000" cy="4953000"/>
+            <a:off x="1223628" y="2183607"/>
+            <a:ext cx="6858000" cy="3714750"/>
           </a:xfrm>
           <a:prstGeom prst="rect">
             <a:avLst/>
@@ -7910,8 +7590,8 @@
         </p:nvSpPr>
         <p:spPr>
           <a:xfrm>
-            <a:off x="7320136" y="1834706"/>
-            <a:ext cx="2232248" cy="1522287"/>
+            <a:off x="5490102" y="2233280"/>
+            <a:ext cx="1674186" cy="1141715"/>
           </a:xfrm>
           <a:prstGeom prst="wedgeEllipseCallout">
             <a:avLst>
@@ -7942,10 +7622,10 @@
           <a:p>
             <a:pPr algn="ctr"/>
             <a:r>
-              <a:rPr lang="en-US" sz="2000" dirty="0"/>
+              <a:rPr lang="en-US" sz="1500" dirty="0"/>
               <a:t>Apache Incubating</a:t>
             </a:r>
-            <a:endParaRPr lang="en-IL" sz="2000" dirty="0"/>
+            <a:endParaRPr lang="en-IL" sz="1500" dirty="0"/>
           </a:p>
         </p:txBody>
       </p:sp>
@@ -8030,6 +7710,7 @@
           </a:bodyPr>
           <a:lstStyle/>
           <a:p>
+            <a:pPr algn="l" rtl="0"/>
             <a:r>
               <a:rPr lang="en-US" dirty="0" smtClean="0"/>
               <a:t>Sketches </a:t>
@@ -8037,7 +7718,9 @@
             <a:r>
               <a:rPr lang="en-US" dirty="0">
                 <a:solidFill>
-                  <a:schemeClr val="accent1"/>
+                  <a:schemeClr val="accent1">
+                    <a:lumMod val="75000"/>
+                  </a:schemeClr>
                 </a:solidFill>
               </a:rPr>
               <a:t>a</a:t>
@@ -8045,17 +7728,16 @@
             <a:r>
               <a:rPr lang="en-US" dirty="0" smtClean="0">
                 <a:solidFill>
-                  <a:schemeClr val="accent1"/>
+                  <a:schemeClr val="accent1">
+                    <a:lumMod val="75000"/>
+                  </a:schemeClr>
                 </a:solidFill>
               </a:rPr>
-              <a:t>ren’t</a:t>
-            </a:r>
-            <a:r>
-              <a:rPr lang="en-US" dirty="0" smtClean="0"/>
-              <a:t> thread safe</a:t>
-            </a:r>
-          </a:p>
-          <a:p>
+              <a:t>ren’t thread safe</a:t>
+            </a:r>
+          </a:p>
+          <a:p>
+            <a:pPr algn="l" rtl="0"/>
             <a:r>
               <a:rPr lang="en-US" dirty="0" smtClean="0"/>
               <a:t>Can’t query </a:t>
@@ -8063,40 +7745,63 @@
             <a:r>
               <a:rPr lang="en-US" dirty="0" smtClean="0">
                 <a:solidFill>
-                  <a:schemeClr val="accent1"/>
+                  <a:schemeClr val="accent1">
+                    <a:lumMod val="75000"/>
+                  </a:schemeClr>
                 </a:solidFill>
               </a:rPr>
               <a:t>while updating</a:t>
             </a:r>
             <a:endParaRPr lang="en-US" dirty="0">
               <a:solidFill>
-                <a:schemeClr val="accent1"/>
+                <a:schemeClr val="accent1">
+                  <a:lumMod val="75000"/>
+                </a:schemeClr>
               </a:solidFill>
             </a:endParaRPr>
           </a:p>
           <a:p>
-            <a:pPr marL="0" indent="0">
+            <a:pPr marL="0" indent="0" algn="l" rtl="0">
               <a:buNone/>
             </a:pPr>
             <a:r>
               <a:rPr lang="en-US" dirty="0" smtClean="0"/>
-              <a:t>Current approach:</a:t>
-            </a:r>
-          </a:p>
-          <a:p>
-            <a:pPr lvl="1"/>
+              <a:t>Current approach</a:t>
+            </a:r>
             <a:r>
               <a:rPr lang="en-US" dirty="0" smtClean="0"/>
-              <a:t>Use lock, or</a:t>
-            </a:r>
-          </a:p>
-          <a:p>
-            <a:pPr lvl="1"/>
+              <a:t>:</a:t>
+            </a:r>
+          </a:p>
+          <a:p>
+            <a:pPr lvl="1" algn="l" rtl="0"/>
+            <a:r>
+              <a:rPr lang="en-US" dirty="0" smtClean="0"/>
+              <a:t>Buggy…</a:t>
+            </a:r>
+            <a:endParaRPr lang="en-US" dirty="0" smtClean="0"/>
+          </a:p>
+          <a:p>
+            <a:pPr lvl="1" algn="l" rtl="0"/>
+            <a:r>
+              <a:rPr lang="en-US" dirty="0" smtClean="0"/>
+              <a:t>Use </a:t>
+            </a:r>
+            <a:r>
+              <a:rPr lang="en-US" dirty="0" smtClean="0"/>
+              <a:t>coarse grain lock</a:t>
+            </a:r>
+            <a:r>
+              <a:rPr lang="en-US" dirty="0" smtClean="0"/>
+              <a:t>, or</a:t>
+            </a:r>
+          </a:p>
+          <a:p>
+            <a:pPr lvl="1" algn="l" rtl="0"/>
             <a:r>
               <a:rPr lang="en-US" dirty="0" smtClean="0"/>
               <a:t>Update in epochs</a:t>
             </a:r>
-            <a:endParaRPr lang="en-US" dirty="0" smtClean="0"/>
           </a:p>
         </p:txBody>
       </p:sp>
@@ -8124,30 +7829,6 @@
           </a:p>
         </p:txBody>
       </p:sp>
-      <p:pic>
-        <p:nvPicPr>
-          <p:cNvPr id="8" name="Picture 7"/>
-          <p:cNvPicPr>
-            <a:picLocks noChangeAspect="1"/>
-          </p:cNvPicPr>
-          <p:nvPr/>
-        </p:nvPicPr>
-        <p:blipFill>
-          <a:blip r:embed="rId3"/>
-          <a:stretch>
-            <a:fillRect/>
-          </a:stretch>
-        </p:blipFill>
-        <p:spPr>
-          <a:xfrm>
-            <a:off x="6867026" y="1825625"/>
-            <a:ext cx="1619250" cy="1619250"/>
-          </a:xfrm>
-          <a:prstGeom prst="rect">
-            <a:avLst/>
-          </a:prstGeom>
-        </p:spPr>
-      </p:pic>
       <p:pic>
         <p:nvPicPr>
           <p:cNvPr id="9" name="Google Shape;173;p16">
@@ -8163,7 +7844,7 @@
           <p:nvPr/>
         </p:nvPicPr>
         <p:blipFill>
-          <a:blip r:embed="rId4">
+          <a:blip r:embed="rId3">
             <a:alphaModFix/>
           </a:blip>
           <a:stretch>
@@ -8172,8 +7853,8 @@
         </p:blipFill>
         <p:spPr>
           <a:xfrm>
-            <a:off x="417653" y="4067620"/>
-            <a:ext cx="3896534" cy="2801782"/>
+            <a:off x="5087637" y="2285999"/>
+            <a:ext cx="3715970" cy="2637693"/>
           </a:xfrm>
           <a:prstGeom prst="rect">
             <a:avLst/>
@@ -8192,10 +7873,10 @@
         </p:nvGrpSpPr>
         <p:grpSpPr>
           <a:xfrm>
-            <a:off x="5073161" y="3003360"/>
-            <a:ext cx="6206170" cy="3718115"/>
-            <a:chOff x="2346395" y="1812247"/>
-            <a:chExt cx="7763560" cy="4498179"/>
+            <a:off x="1579677" y="4003418"/>
+            <a:ext cx="3502275" cy="2393236"/>
+            <a:chOff x="4715710" y="1812247"/>
+            <a:chExt cx="5394245" cy="3272939"/>
           </a:xfrm>
         </p:grpSpPr>
         <p:sp>
@@ -8235,20 +7916,20 @@
             </a:ln>
           </p:spPr>
           <p:txBody>
-            <a:bodyPr lIns="91425" tIns="91425" rIns="91425" bIns="91425" anchor="ctr" anchorCtr="0">
+            <a:bodyPr lIns="68569" tIns="68569" rIns="68569" bIns="68569" anchor="ctr" anchorCtr="0">
               <a:noAutofit/>
             </a:bodyPr>
             <a:lstStyle/>
             <a:p>
               <a:r>
-                <a:rPr lang="en-US" dirty="0"/>
+                <a:rPr lang="en-US" sz="1350" dirty="0"/>
                 <a:t>     </a:t>
               </a:r>
               <a:r>
-                <a:rPr lang="en-US" dirty="0" smtClean="0"/>
+                <a:rPr lang="en-US" sz="1350" dirty="0"/>
                 <a:t>update</a:t>
               </a:r>
-              <a:endParaRPr dirty="0"/>
+              <a:endParaRPr sz="1350" dirty="0"/>
             </a:p>
           </p:txBody>
         </p:sp>
@@ -8289,24 +7970,24 @@
             </a:ln>
           </p:spPr>
           <p:txBody>
-            <a:bodyPr lIns="91425" tIns="91425" rIns="91425" bIns="91425" anchor="ctr" anchorCtr="0">
+            <a:bodyPr lIns="68569" tIns="68569" rIns="68569" bIns="68569" anchor="ctr" anchorCtr="0">
               <a:noAutofit/>
             </a:bodyPr>
             <a:lstStyle/>
             <a:p>
               <a:pPr algn="ctr"/>
               <a:r>
-                <a:rPr lang="en-US" dirty="0"/>
+                <a:rPr lang="en-US" sz="1350" dirty="0"/>
                 <a:t>Old</a:t>
               </a:r>
             </a:p>
             <a:p>
               <a:pPr algn="ctr"/>
               <a:r>
-                <a:rPr lang="en-US" dirty="0"/>
+                <a:rPr lang="en-US" sz="1350" dirty="0"/>
                 <a:t>Data Store</a:t>
               </a:r>
-              <a:endParaRPr dirty="0"/>
+              <a:endParaRPr sz="1350" dirty="0"/>
             </a:p>
           </p:txBody>
         </p:sp>
@@ -8323,7 +8004,7 @@
             <p:nvPr/>
           </p:nvPicPr>
           <p:blipFill>
-            <a:blip r:embed="rId5" cstate="print">
+            <a:blip r:embed="rId4" cstate="print">
               <a:alphaModFix/>
             </a:blip>
             <a:stretch>
@@ -8370,14 +8051,14 @@
             </a:ln>
           </p:spPr>
           <p:txBody>
-            <a:bodyPr lIns="91425" tIns="91425" rIns="91425" bIns="91425" anchor="t" anchorCtr="0">
+            <a:bodyPr lIns="68569" tIns="68569" rIns="68569" bIns="68569" anchor="t" anchorCtr="0">
               <a:noAutofit/>
             </a:bodyPr>
             <a:lstStyle/>
             <a:p>
               <a:pPr algn="ctr"/>
               <a:r>
-                <a:rPr lang="en-US" dirty="0"/>
+                <a:rPr lang="en-US" sz="1350" dirty="0"/>
                 <a:t>query</a:t>
               </a:r>
             </a:p>
@@ -8435,7 +8116,7 @@
             <a:lstStyle/>
             <a:p>
               <a:pPr algn="ctr"/>
-              <a:endParaRPr lang="en-US" sz="1600" dirty="0" err="1">
+              <a:endParaRPr lang="en-US" sz="1200" dirty="0" err="1">
                 <a:solidFill>
                   <a:schemeClr val="tx1"/>
                 </a:solidFill>
@@ -8482,266 +8163,27 @@
             </a:ln>
           </p:spPr>
           <p:txBody>
-            <a:bodyPr lIns="91425" tIns="91425" rIns="91425" bIns="91425" anchor="ctr" anchorCtr="0">
+            <a:bodyPr lIns="68569" tIns="68569" rIns="68569" bIns="68569" anchor="ctr" anchorCtr="0">
               <a:noAutofit/>
             </a:bodyPr>
             <a:lstStyle/>
             <a:p>
               <a:pPr algn="ctr"/>
               <a:r>
-                <a:rPr lang="en-US" dirty="0"/>
+                <a:rPr lang="en-US" sz="1350" dirty="0"/>
                 <a:t>New </a:t>
               </a:r>
             </a:p>
             <a:p>
               <a:pPr algn="ctr"/>
               <a:r>
-                <a:rPr lang="en-US" dirty="0"/>
+                <a:rPr lang="en-US" sz="1350" dirty="0"/>
                 <a:t>Data Store</a:t>
               </a:r>
-              <a:endParaRPr dirty="0"/>
+              <a:endParaRPr sz="1350" dirty="0"/>
             </a:p>
           </p:txBody>
         </p:sp>
-        <p:sp>
-          <p:nvSpPr>
-            <p:cNvPr id="17" name="Shape 153">
-              <a:extLst>
-                <a:ext uri="{FF2B5EF4-FFF2-40B4-BE49-F238E27FC236}">
-                  <a16:creationId xmlns:a16="http://schemas.microsoft.com/office/drawing/2014/main" id="{3EEB3216-A533-46C4-B1C5-F51CE1EAA725}"/>
-                </a:ext>
-              </a:extLst>
-            </p:cNvPr>
-            <p:cNvSpPr/>
-            <p:nvPr/>
-          </p:nvSpPr>
-          <p:spPr>
-            <a:xfrm rot="-2647579">
-              <a:off x="3715110" y="5126506"/>
-              <a:ext cx="1276183" cy="381029"/>
-            </a:xfrm>
-            <a:prstGeom prst="rightArrow">
-              <a:avLst>
-                <a:gd name="adj1" fmla="val 50000"/>
-                <a:gd name="adj2" fmla="val 49999"/>
-              </a:avLst>
-            </a:prstGeom>
-            <a:solidFill>
-              <a:schemeClr val="lt2"/>
-            </a:solidFill>
-            <a:ln w="19050" cap="flat" cmpd="sng">
-              <a:solidFill>
-                <a:schemeClr val="dk2"/>
-              </a:solidFill>
-              <a:prstDash val="solid"/>
-              <a:round/>
-              <a:headEnd type="none" w="med" len="med"/>
-              <a:tailEnd type="none" w="med" len="med"/>
-            </a:ln>
-          </p:spPr>
-          <p:txBody>
-            <a:bodyPr lIns="91425" tIns="91425" rIns="91425" bIns="91425" anchor="ctr" anchorCtr="0">
-              <a:noAutofit/>
-            </a:bodyPr>
-            <a:lstStyle/>
-            <a:p>
-              <a:endParaRPr dirty="0"/>
-            </a:p>
-          </p:txBody>
-        </p:sp>
-        <p:sp>
-          <p:nvSpPr>
-            <p:cNvPr id="18" name="Shape 154">
-              <a:extLst>
-                <a:ext uri="{FF2B5EF4-FFF2-40B4-BE49-F238E27FC236}">
-                  <a16:creationId xmlns:a16="http://schemas.microsoft.com/office/drawing/2014/main" id="{5032CC79-388B-45C6-9C19-1E8C56BFB94A}"/>
-                </a:ext>
-              </a:extLst>
-            </p:cNvPr>
-            <p:cNvSpPr/>
-            <p:nvPr/>
-          </p:nvSpPr>
-          <p:spPr>
-            <a:xfrm>
-              <a:off x="3722152" y="4385485"/>
-              <a:ext cx="861680" cy="381000"/>
-            </a:xfrm>
-            <a:prstGeom prst="rightArrow">
-              <a:avLst>
-                <a:gd name="adj1" fmla="val 50000"/>
-                <a:gd name="adj2" fmla="val 50000"/>
-              </a:avLst>
-            </a:prstGeom>
-            <a:solidFill>
-              <a:schemeClr val="lt2"/>
-            </a:solidFill>
-            <a:ln w="19050" cap="flat" cmpd="sng">
-              <a:solidFill>
-                <a:schemeClr val="dk2"/>
-              </a:solidFill>
-              <a:prstDash val="solid"/>
-              <a:round/>
-              <a:headEnd type="none" w="med" len="med"/>
-              <a:tailEnd type="none" w="med" len="med"/>
-            </a:ln>
-          </p:spPr>
-          <p:txBody>
-            <a:bodyPr lIns="91425" tIns="91425" rIns="91425" bIns="91425" anchor="ctr" anchorCtr="0">
-              <a:noAutofit/>
-            </a:bodyPr>
-            <a:lstStyle/>
-            <a:p>
-              <a:endParaRPr dirty="0"/>
-            </a:p>
-          </p:txBody>
-        </p:sp>
-        <p:pic>
-          <p:nvPicPr>
-            <p:cNvPr id="19" name="Picture 18">
-              <a:extLst>
-                <a:ext uri="{FF2B5EF4-FFF2-40B4-BE49-F238E27FC236}">
-                  <a16:creationId xmlns:a16="http://schemas.microsoft.com/office/drawing/2014/main" id="{BC52C225-0CED-4F33-9AE0-40FA4CAEFBEF}"/>
-                </a:ext>
-              </a:extLst>
-            </p:cNvPr>
-            <p:cNvPicPr>
-              <a:picLocks noChangeAspect="1"/>
-            </p:cNvPicPr>
-            <p:nvPr/>
-          </p:nvPicPr>
-          <p:blipFill>
-            <a:blip r:embed="rId6" cstate="print">
-              <a:clrChange>
-                <a:clrFrom>
-                  <a:srgbClr val="FFFFFF"/>
-                </a:clrFrom>
-                <a:clrTo>
-                  <a:srgbClr val="FFFFFF">
-                    <a:alpha val="0"/>
-                  </a:srgbClr>
-                </a:clrTo>
-              </a:clrChange>
-            </a:blip>
-            <a:stretch>
-              <a:fillRect/>
-            </a:stretch>
-          </p:blipFill>
-          <p:spPr>
-            <a:xfrm>
-              <a:off x="2934643" y="3099790"/>
-              <a:ext cx="804772" cy="804772"/>
-            </a:xfrm>
-            <a:prstGeom prst="rect">
-              <a:avLst/>
-            </a:prstGeom>
-          </p:spPr>
-        </p:pic>
-        <p:sp>
-          <p:nvSpPr>
-            <p:cNvPr id="20" name="Shape 152">
-              <a:extLst>
-                <a:ext uri="{FF2B5EF4-FFF2-40B4-BE49-F238E27FC236}">
-                  <a16:creationId xmlns:a16="http://schemas.microsoft.com/office/drawing/2014/main" id="{1AA60902-94FC-4C80-9FAB-6B76882D0F69}"/>
-                </a:ext>
-              </a:extLst>
-            </p:cNvPr>
-            <p:cNvSpPr/>
-            <p:nvPr/>
-          </p:nvSpPr>
-          <p:spPr>
-            <a:xfrm rot="2021648">
-              <a:off x="3642720" y="3736573"/>
-              <a:ext cx="1171274" cy="380995"/>
-            </a:xfrm>
-            <a:prstGeom prst="rightArrow">
-              <a:avLst>
-                <a:gd name="adj1" fmla="val 50000"/>
-                <a:gd name="adj2" fmla="val 49999"/>
-              </a:avLst>
-            </a:prstGeom>
-            <a:solidFill>
-              <a:schemeClr val="lt2"/>
-            </a:solidFill>
-            <a:ln w="19050" cap="flat" cmpd="sng">
-              <a:solidFill>
-                <a:schemeClr val="dk2"/>
-              </a:solidFill>
-              <a:prstDash val="solid"/>
-              <a:round/>
-              <a:headEnd type="none" w="med" len="med"/>
-              <a:tailEnd type="none" w="med" len="med"/>
-            </a:ln>
-          </p:spPr>
-          <p:txBody>
-            <a:bodyPr lIns="91425" tIns="91425" rIns="91425" bIns="91425" anchor="ctr" anchorCtr="0">
-              <a:noAutofit/>
-            </a:bodyPr>
-            <a:lstStyle/>
-            <a:p>
-              <a:endParaRPr lang="en-US" dirty="0"/>
-            </a:p>
-          </p:txBody>
-        </p:sp>
-        <p:pic>
-          <p:nvPicPr>
-            <p:cNvPr id="21" name="Picture 20">
-              <a:extLst>
-                <a:ext uri="{FF2B5EF4-FFF2-40B4-BE49-F238E27FC236}">
-                  <a16:creationId xmlns:a16="http://schemas.microsoft.com/office/drawing/2014/main" id="{51CF0E85-3BDD-4E96-81CE-99CAF0417356}"/>
-                </a:ext>
-              </a:extLst>
-            </p:cNvPr>
-            <p:cNvPicPr>
-              <a:picLocks noChangeAspect="1"/>
-            </p:cNvPicPr>
-            <p:nvPr/>
-          </p:nvPicPr>
-          <p:blipFill>
-            <a:blip r:embed="rId7" cstate="print"/>
-            <a:stretch>
-              <a:fillRect/>
-            </a:stretch>
-          </p:blipFill>
-          <p:spPr>
-            <a:xfrm>
-              <a:off x="2346395" y="3228356"/>
-              <a:ext cx="547640" cy="547640"/>
-            </a:xfrm>
-            <a:prstGeom prst="rect">
-              <a:avLst/>
-            </a:prstGeom>
-          </p:spPr>
-        </p:pic>
-        <p:pic>
-          <p:nvPicPr>
-            <p:cNvPr id="22" name="Picture 21">
-              <a:extLst>
-                <a:ext uri="{FF2B5EF4-FFF2-40B4-BE49-F238E27FC236}">
-                  <a16:creationId xmlns:a16="http://schemas.microsoft.com/office/drawing/2014/main" id="{B7A326A0-8AF3-4E86-BEC5-240FFB251DC1}"/>
-                </a:ext>
-              </a:extLst>
-            </p:cNvPr>
-            <p:cNvPicPr>
-              <a:picLocks noChangeAspect="1"/>
-            </p:cNvPicPr>
-            <p:nvPr/>
-          </p:nvPicPr>
-          <p:blipFill>
-            <a:blip r:embed="rId8" cstate="print"/>
-            <a:stretch>
-              <a:fillRect/>
-            </a:stretch>
-          </p:blipFill>
-          <p:spPr>
-            <a:xfrm>
-              <a:off x="2631306" y="5378526"/>
-              <a:ext cx="1223707" cy="931900"/>
-            </a:xfrm>
-            <a:prstGeom prst="rect">
-              <a:avLst/>
-            </a:prstGeom>
-          </p:spPr>
-        </p:pic>
         <p:pic>
           <p:nvPicPr>
             <p:cNvPr id="23" name="Picture 22">
@@ -8757,7 +8199,7 @@
             <p:nvPr/>
           </p:nvPicPr>
           <p:blipFill>
-            <a:blip r:embed="rId9" cstate="print"/>
+            <a:blip r:embed="rId5" cstate="print"/>
             <a:stretch>
               <a:fillRect/>
             </a:stretch>
@@ -8766,42 +8208,6 @@
             <a:xfrm>
               <a:off x="8718746" y="1812247"/>
               <a:ext cx="1391209" cy="1112967"/>
-            </a:xfrm>
-            <a:prstGeom prst="rect">
-              <a:avLst/>
-            </a:prstGeom>
-          </p:spPr>
-        </p:pic>
-        <p:pic>
-          <p:nvPicPr>
-            <p:cNvPr id="24" name="Picture 23">
-              <a:extLst>
-                <a:ext uri="{FF2B5EF4-FFF2-40B4-BE49-F238E27FC236}">
-                  <a16:creationId xmlns:a16="http://schemas.microsoft.com/office/drawing/2014/main" id="{2B0415F5-5307-46AC-B832-D910AA25633B}"/>
-                </a:ext>
-              </a:extLst>
-            </p:cNvPr>
-            <p:cNvPicPr>
-              <a:picLocks noChangeAspect="1"/>
-            </p:cNvPicPr>
-            <p:nvPr/>
-          </p:nvPicPr>
-          <p:blipFill>
-            <a:blip r:embed="rId10" cstate="hqprint">
-              <a:extLst>
-                <a:ext uri="{28A0092B-C50C-407E-A947-70E740481C1C}">
-                  <a14:useLocalDpi xmlns:a14="http://schemas.microsoft.com/office/drawing/2010/main" val="0"/>
-                </a:ext>
-              </a:extLst>
-            </a:blip>
-            <a:stretch>
-              <a:fillRect/>
-            </a:stretch>
-          </p:blipFill>
-          <p:spPr>
-            <a:xfrm>
-              <a:off x="2530868" y="4140358"/>
-              <a:ext cx="1122317" cy="1066334"/>
             </a:xfrm>
             <a:prstGeom prst="rect">
               <a:avLst/>
@@ -8986,8 +8392,8 @@
         </p:blipFill>
         <p:spPr>
           <a:xfrm rot="15696024">
-            <a:off x="4782862" y="5325622"/>
-            <a:ext cx="411924" cy="535745"/>
+            <a:off x="4475170" y="5677944"/>
+            <a:ext cx="308943" cy="401809"/>
           </a:xfrm>
           <a:prstGeom prst="rect">
             <a:avLst/>
@@ -9031,13 +8437,18 @@
             <p:ph idx="1"/>
           </p:nvPr>
         </p:nvSpPr>
-        <p:spPr/>
+        <p:spPr>
+          <a:ln>
+            <a:noFill/>
+          </a:ln>
+        </p:spPr>
         <p:txBody>
           <a:bodyPr>
             <a:normAutofit lnSpcReduction="10000"/>
           </a:bodyPr>
           <a:lstStyle/>
           <a:p>
+            <a:pPr algn="l" rtl="0"/>
             <a:r>
               <a:rPr lang="en-US" dirty="0">
                 <a:solidFill>
@@ -9052,6 +8463,7 @@
             </a:r>
           </a:p>
           <a:p>
+            <a:pPr algn="l" rtl="0"/>
             <a:r>
               <a:rPr lang="en-US" dirty="0" smtClean="0"/>
               <a:t>High </a:t>
@@ -9074,20 +8486,21 @@
             </a:r>
           </a:p>
           <a:p>
-            <a:pPr lvl="1"/>
+            <a:pPr lvl="1" algn="l" rtl="0"/>
             <a:r>
               <a:rPr lang="en-US" dirty="0"/>
               <a:t>Concurrent updates</a:t>
             </a:r>
           </a:p>
           <a:p>
-            <a:pPr lvl="1"/>
+            <a:pPr lvl="1" algn="l" rtl="0"/>
             <a:r>
               <a:rPr lang="en-US" dirty="0"/>
               <a:t>Harness multi-cores for multi-threaded stream processing</a:t>
             </a:r>
           </a:p>
           <a:p>
+            <a:pPr algn="l" rtl="0"/>
             <a:r>
               <a:rPr lang="en-US" dirty="0"/>
               <a:t>Query </a:t>
@@ -9102,13 +8515,14 @@
             </a:r>
           </a:p>
           <a:p>
-            <a:pPr lvl="1"/>
+            <a:pPr lvl="1" algn="l" rtl="0"/>
             <a:r>
               <a:rPr lang="en-US" dirty="0"/>
               <a:t>Allow queries during updates</a:t>
             </a:r>
           </a:p>
           <a:p>
+            <a:pPr algn="l" rtl="0"/>
             <a:r>
               <a:rPr lang="en-US" dirty="0" smtClean="0"/>
               <a:t>Enjoy </a:t>
@@ -9119,32 +8533,41 @@
             </a:r>
           </a:p>
           <a:p>
-            <a:pPr lvl="1"/>
+            <a:pPr lvl="1" algn="l" rtl="0"/>
             <a:r>
               <a:rPr lang="en-US" dirty="0"/>
               <a:t>Fast</a:t>
             </a:r>
           </a:p>
           <a:p>
-            <a:pPr lvl="1"/>
+            <a:pPr lvl="1" algn="l" rtl="0"/>
             <a:r>
               <a:rPr lang="en-US" dirty="0" smtClean="0">
                 <a:solidFill>
-                  <a:schemeClr val="accent1"/>
+                  <a:schemeClr val="accent1">
+                    <a:lumMod val="75000"/>
+                  </a:schemeClr>
                 </a:solidFill>
               </a:rPr>
               <a:t>Provably bounded estimation error</a:t>
             </a:r>
-          </a:p>
-          <a:p>
-            <a:pPr lvl="1"/>
+            <a:endParaRPr lang="en-US" dirty="0" smtClean="0">
+              <a:solidFill>
+                <a:schemeClr val="accent1">
+                  <a:lumMod val="75000"/>
+                </a:schemeClr>
+              </a:solidFill>
+            </a:endParaRPr>
+          </a:p>
+          <a:p>
+            <a:pPr lvl="1" algn="l" rtl="0"/>
             <a:r>
               <a:rPr lang="en-US" dirty="0" smtClean="0"/>
               <a:t>Small memory footprint</a:t>
             </a:r>
           </a:p>
           <a:p>
-            <a:pPr marL="457200" lvl="1" indent="0">
+            <a:pPr marL="342900" lvl="1" indent="0" algn="l" rtl="0">
               <a:buNone/>
             </a:pPr>
             <a:endParaRPr lang="en-US" dirty="0"/>
@@ -9183,8 +8606,8 @@
         </p:nvSpPr>
         <p:spPr>
           <a:xfrm>
-            <a:off x="6365175" y="4013861"/>
-            <a:ext cx="2600696" cy="736270"/>
+            <a:off x="6092727" y="4694123"/>
+            <a:ext cx="1950522" cy="552203"/>
           </a:xfrm>
           <a:prstGeom prst="wedgeRoundRectCallout">
             <a:avLst>
@@ -9216,7 +8639,7 @@
           <a:p>
             <a:pPr algn="ctr"/>
             <a:r>
-              <a:rPr lang="en-US" sz="2400" dirty="0"/>
+              <a:rPr lang="en-US" dirty="0"/>
               <a:t>Main challenge</a:t>
             </a:r>
           </a:p>
@@ -9370,8 +8793,8 @@
         </p:nvSpPr>
         <p:spPr bwMode="auto">
           <a:xfrm>
-            <a:off x="10447338" y="712789"/>
-            <a:ext cx="304800" cy="304801"/>
+            <a:off x="7835504" y="1391842"/>
+            <a:ext cx="228600" cy="228601"/>
           </a:xfrm>
           <a:prstGeom prst="rect">
             <a:avLst/>
@@ -9388,14 +8811,14 @@
           </a:extLst>
         </p:spPr>
         <p:txBody>
-          <a:bodyPr vert="horz" wrap="square" lIns="91440" tIns="45720" rIns="91440" bIns="45720" numCol="1" anchor="t" anchorCtr="0" compatLnSpc="1">
+          <a:bodyPr vert="horz" wrap="square" lIns="68580" tIns="34290" rIns="68580" bIns="34290" numCol="1" anchor="t" anchorCtr="0" compatLnSpc="1">
             <a:prstTxWarp prst="textNoShape">
               <a:avLst/>
             </a:prstTxWarp>
           </a:bodyPr>
           <a:lstStyle/>
           <a:p>
-            <a:endParaRPr lang="he-IL"/>
+            <a:endParaRPr lang="he-IL" sz="1350"/>
           </a:p>
         </p:txBody>
       </p:sp>
@@ -9432,8 +8855,8 @@
         </p:blipFill>
         <p:spPr bwMode="auto">
           <a:xfrm>
-            <a:off x="2289994" y="1671893"/>
-            <a:ext cx="6315075" cy="3905251"/>
+            <a:off x="1478417" y="1847448"/>
+            <a:ext cx="6585687" cy="4072598"/>
           </a:xfrm>
           <a:prstGeom prst="rect">
             <a:avLst/>
@@ -9458,8 +8881,8 @@
         </p:nvSpPr>
         <p:spPr>
           <a:xfrm>
-            <a:off x="1811344" y="2269271"/>
-            <a:ext cx="914400" cy="2807819"/>
+            <a:off x="1358508" y="2559204"/>
+            <a:ext cx="685800" cy="2105864"/>
           </a:xfrm>
           <a:prstGeom prst="rect">
             <a:avLst/>
@@ -9478,14 +8901,14 @@
           <a:lstStyle/>
           <a:p>
             <a:r>
-              <a:rPr lang="en-US" dirty="0"/>
+              <a:rPr lang="en-US" sz="1350" dirty="0"/>
               <a:t>Throughput (million ops\ sec)</a:t>
             </a:r>
           </a:p>
         </p:txBody>
       </p:sp>
-      <mc:AlternateContent xmlns:mc="http://schemas.openxmlformats.org/markup-compatibility/2006" xmlns:a14="http://schemas.microsoft.com/office/drawing/2010/main">
-        <mc:Choice Requires="a14">
+      <mc:AlternateContent xmlns:mc="http://schemas.openxmlformats.org/markup-compatibility/2006">
+        <mc:Choice xmlns:a14="http://schemas.microsoft.com/office/drawing/2010/main" Requires="a14">
           <p:sp>
             <p:nvSpPr>
               <p:cNvPr id="8" name="Oval Callout 7"/>
@@ -9494,8 +8917,8 @@
             </p:nvSpPr>
             <p:spPr>
               <a:xfrm>
-                <a:off x="4991299" y="1993305"/>
-                <a:ext cx="2209403" cy="551930"/>
+                <a:off x="4130336" y="2774260"/>
+                <a:ext cx="1657052" cy="413948"/>
               </a:xfrm>
               <a:prstGeom prst="wedgeEllipseCallout">
                 <a:avLst>
@@ -9536,7 +8959,7 @@
               <a:p>
                 <a:pPr algn="ctr"/>
                 <a:r>
-                  <a:rPr lang="en-US" dirty="0">
+                  <a:rPr lang="en-US" sz="1350" dirty="0">
                     <a:solidFill>
                       <a:schemeClr val="tx1"/>
                     </a:solidFill>
@@ -9551,7 +8974,7 @@
                       <m:rPr>
                         <m:sty m:val="p"/>
                       </m:rPr>
-                      <a:rPr lang="en-US" dirty="0">
+                      <a:rPr lang="en-US" sz="1350" dirty="0">
                         <a:solidFill>
                           <a:schemeClr val="tx1"/>
                         </a:solidFill>
@@ -9562,7 +8985,7 @@
                     </m:r>
                   </m:oMath>
                 </a14:m>
-                <a:endParaRPr lang="en-US" dirty="0">
+                <a:endParaRPr lang="en-US" sz="1350" dirty="0">
                   <a:solidFill>
                     <a:schemeClr val="tx1"/>
                   </a:solidFill>
@@ -9573,7 +8996,7 @@
             </p:txBody>
           </p:sp>
         </mc:Choice>
-        <mc:Fallback xmlns="">
+        <mc:Fallback>
           <p:sp>
             <p:nvSpPr>
               <p:cNvPr id="8" name="Oval Callout 7"/>
@@ -9584,8 +9007,8 @@
             </p:nvSpPr>
             <p:spPr>
               <a:xfrm>
-                <a:off x="4991299" y="1993305"/>
-                <a:ext cx="2209403" cy="551930"/>
+                <a:off x="4130336" y="2774260"/>
+                <a:ext cx="1657052" cy="413948"/>
               </a:xfrm>
               <a:prstGeom prst="wedgeEllipseCallout">
                 <a:avLst>
@@ -9610,7 +9033,7 @@
               <a:lstStyle/>
               <a:p>
                 <a:r>
-                  <a:rPr lang="en-US">
+                  <a:rPr lang="he-IL">
                     <a:noFill/>
                   </a:rPr>
                   <a:t> </a:t>
@@ -9620,8 +9043,8 @@
           </p:sp>
         </mc:Fallback>
       </mc:AlternateContent>
-      <mc:AlternateContent xmlns:mc="http://schemas.openxmlformats.org/markup-compatibility/2006" xmlns:a14="http://schemas.microsoft.com/office/drawing/2010/main">
-        <mc:Choice Requires="a14">
+      <mc:AlternateContent xmlns:mc="http://schemas.openxmlformats.org/markup-compatibility/2006">
+        <mc:Choice xmlns:a14="http://schemas.microsoft.com/office/drawing/2010/main" Requires="a14">
           <p:sp>
             <p:nvSpPr>
               <p:cNvPr id="9" name="Oval Callout 8"/>
@@ -9630,8 +9053,8 @@
             </p:nvSpPr>
             <p:spPr>
               <a:xfrm>
-                <a:off x="7233750" y="3311031"/>
-                <a:ext cx="2131706" cy="724297"/>
+                <a:off x="5434104" y="3929611"/>
+                <a:ext cx="1598780" cy="543223"/>
               </a:xfrm>
               <a:prstGeom prst="wedgeEllipseCallout">
                 <a:avLst>
@@ -9672,7 +9095,7 @@
               <a:p>
                 <a:pPr algn="ctr"/>
                 <a:r>
-                  <a:rPr lang="en-US" dirty="0">
+                  <a:rPr lang="en-US" sz="1350" dirty="0">
                     <a:solidFill>
                       <a:schemeClr val="tx1"/>
                     </a:solidFill>
@@ -9687,7 +9110,7 @@
                       <m:rPr>
                         <m:sty m:val="p"/>
                       </m:rPr>
-                      <a:rPr lang="en-US" dirty="0">
+                      <a:rPr lang="en-US" sz="1350" dirty="0">
                         <a:solidFill>
                           <a:schemeClr val="tx1"/>
                         </a:solidFill>
@@ -9698,7 +9121,7 @@
                     </m:r>
                   </m:oMath>
                 </a14:m>
-                <a:endParaRPr lang="en-US" dirty="0">
+                <a:endParaRPr lang="en-US" sz="1350" dirty="0">
                   <a:solidFill>
                     <a:schemeClr val="tx1"/>
                   </a:solidFill>
@@ -9709,7 +9132,7 @@
             </p:txBody>
           </p:sp>
         </mc:Choice>
-        <mc:Fallback xmlns="">
+        <mc:Fallback>
           <p:sp>
             <p:nvSpPr>
               <p:cNvPr id="9" name="Oval Callout 8"/>
@@ -9720,8 +9143,8 @@
             </p:nvSpPr>
             <p:spPr>
               <a:xfrm>
-                <a:off x="7233750" y="3311031"/>
-                <a:ext cx="2131706" cy="724297"/>
+                <a:off x="5434104" y="3929611"/>
+                <a:ext cx="1598780" cy="543223"/>
               </a:xfrm>
               <a:prstGeom prst="wedgeEllipseCallout">
                 <a:avLst>
@@ -9746,7 +9169,7 @@
               <a:lstStyle/>
               <a:p>
                 <a:r>
-                  <a:rPr lang="en-US">
+                  <a:rPr lang="he-IL">
                     <a:noFill/>
                   </a:rPr>
                   <a:t> </a:t>
@@ -9756,125 +9179,6 @@
           </p:sp>
         </mc:Fallback>
       </mc:AlternateContent>
-      <p:sp>
-        <p:nvSpPr>
-          <p:cNvPr id="12" name="Oval Callout 11"/>
-          <p:cNvSpPr/>
-          <p:nvPr/>
-        </p:nvSpPr>
-        <p:spPr>
-          <a:xfrm>
-            <a:off x="2471250" y="2877500"/>
-            <a:ext cx="2131706" cy="724297"/>
-          </a:xfrm>
-          <a:prstGeom prst="wedgeEllipseCallout">
-            <a:avLst>
-              <a:gd name="adj1" fmla="val -15231"/>
-              <a:gd name="adj2" fmla="val 157591"/>
-            </a:avLst>
-          </a:prstGeom>
-          <a:solidFill>
-            <a:schemeClr val="bg1"/>
-          </a:solidFill>
-          <a:ln w="3175">
-            <a:solidFill>
-              <a:srgbClr val="5600BF"/>
-            </a:solidFill>
-          </a:ln>
-        </p:spPr>
-        <p:style>
-          <a:lnRef idx="2">
-            <a:schemeClr val="accent1">
-              <a:shade val="50000"/>
-            </a:schemeClr>
-          </a:lnRef>
-          <a:fillRef idx="1">
-            <a:schemeClr val="accent1"/>
-          </a:fillRef>
-          <a:effectRef idx="0">
-            <a:schemeClr val="accent1"/>
-          </a:effectRef>
-          <a:fontRef idx="minor">
-            <a:schemeClr val="lt1"/>
-          </a:fontRef>
-        </p:style>
-        <p:txBody>
-          <a:bodyPr rtlCol="0" anchor="t">
-            <a:noAutofit/>
-          </a:bodyPr>
-          <a:lstStyle/>
-          <a:p>
-            <a:pPr algn="ctr"/>
-            <a:r>
-              <a:rPr lang="en-US" dirty="0">
-                <a:solidFill>
-                  <a:schemeClr val="tx1"/>
-                </a:solidFill>
-                <a:latin typeface="Arial" pitchFamily="34" charset="0"/>
-                <a:cs typeface="Arial" pitchFamily="34" charset="0"/>
-              </a:rPr>
-              <a:t>original (not thread-safe)</a:t>
-            </a:r>
-          </a:p>
-        </p:txBody>
-      </p:sp>
-      <p:sp>
-        <p:nvSpPr>
-          <p:cNvPr id="10" name="Oval 9"/>
-          <p:cNvSpPr/>
-          <p:nvPr/>
-        </p:nvSpPr>
-        <p:spPr>
-          <a:xfrm>
-            <a:off x="3081130" y="4322695"/>
-            <a:ext cx="298174" cy="318053"/>
-          </a:xfrm>
-          <a:prstGeom prst="ellipse">
-            <a:avLst/>
-          </a:prstGeom>
-          <a:noFill/>
-          <a:ln w="3175">
-            <a:solidFill>
-              <a:schemeClr val="accent1">
-                <a:lumMod val="40000"/>
-                <a:lumOff val="60000"/>
-              </a:schemeClr>
-            </a:solidFill>
-          </a:ln>
-        </p:spPr>
-        <p:style>
-          <a:lnRef idx="2">
-            <a:schemeClr val="accent1">
-              <a:shade val="50000"/>
-            </a:schemeClr>
-          </a:lnRef>
-          <a:fillRef idx="1">
-            <a:schemeClr val="accent1"/>
-          </a:fillRef>
-          <a:effectRef idx="0">
-            <a:schemeClr val="accent1"/>
-          </a:effectRef>
-          <a:fontRef idx="minor">
-            <a:schemeClr val="lt1"/>
-          </a:fontRef>
-        </p:style>
-        <p:txBody>
-          <a:bodyPr rtlCol="0" anchor="t">
-            <a:normAutofit fontScale="62500" lnSpcReduction="20000"/>
-          </a:bodyPr>
-          <a:lstStyle/>
-          <a:p>
-            <a:pPr algn="ctr"/>
-            <a:endParaRPr lang="en-US" sz="1600" dirty="0" err="1">
-              <a:solidFill>
-                <a:schemeClr val="tx1"/>
-              </a:solidFill>
-              <a:latin typeface="Arial" pitchFamily="34" charset="0"/>
-              <a:cs typeface="Arial" pitchFamily="34" charset="0"/>
-            </a:endParaRPr>
-          </a:p>
-        </p:txBody>
-      </p:sp>
     </p:spTree>
     <p:extLst>
       <p:ext uri="{BB962C8B-B14F-4D97-AF65-F5344CB8AC3E}">
@@ -9959,9 +9263,12 @@
         </p:nvSpPr>
         <p:spPr/>
         <p:txBody>
-          <a:bodyPr/>
+          <a:bodyPr>
+            <a:normAutofit fontScale="92500"/>
+          </a:bodyPr>
           <a:lstStyle/>
           <a:p>
+            <a:pPr algn="l" rtl="0"/>
             <a:r>
               <a:rPr lang="en-US" dirty="0"/>
               <a:t>Traditional approach for concurrent data structures: </a:t>
@@ -9999,7 +9306,7 @@
             </a:r>
           </a:p>
           <a:p>
-            <a:pPr marL="0" indent="0">
+            <a:pPr marL="0" indent="0" algn="l" rtl="0">
               <a:buNone/>
             </a:pPr>
             <a:r>
@@ -10008,7 +9315,7 @@
             </a:r>
           </a:p>
           <a:p>
-            <a:pPr marL="457200" indent="-457200">
+            <a:pPr marL="342900" indent="-342900" algn="l" rtl="0">
               <a:buFont typeface="+mj-lt"/>
               <a:buAutoNum type="arabicPeriod"/>
             </a:pPr>
@@ -10025,7 +9332,7 @@
             </a:r>
           </a:p>
           <a:p>
-            <a:pPr marL="457200" indent="-457200">
+            <a:pPr marL="342900" indent="-342900" algn="l" rtl="0">
               <a:buFont typeface="+mj-lt"/>
               <a:buAutoNum type="arabicPeriod"/>
             </a:pPr>
@@ -10042,24 +9349,69 @@
             </a:r>
           </a:p>
           <a:p>
-            <a:pPr marL="457200" indent="-457200">
+            <a:pPr marL="342900" indent="-342900" algn="l" rtl="0">
               <a:buFont typeface="+mj-lt"/>
               <a:buAutoNum type="arabicPeriod"/>
             </a:pPr>
             <a:r>
               <a:rPr lang="en-US" dirty="0"/>
-              <a:t>Linearizability not good enough for randomized algorithms</a:t>
-            </a:r>
-          </a:p>
-          <a:p>
-            <a:pPr marL="457200" indent="-457200">
+              <a:t>Linearizability not good enough for randomized </a:t>
+            </a:r>
+            <a:r>
+              <a:rPr lang="en-US" dirty="0" smtClean="0"/>
+              <a:t>algorithms</a:t>
+            </a:r>
+            <a:r>
+              <a:rPr lang="en-US" dirty="0">
+                <a:solidFill>
+                  <a:schemeClr val="bg1">
+                    <a:lumMod val="50000"/>
+                  </a:schemeClr>
+                </a:solidFill>
+              </a:rPr>
+              <a:t> </a:t>
+            </a:r>
+            <a:r>
+              <a:rPr lang="en-US" sz="2200" dirty="0">
+                <a:solidFill>
+                  <a:schemeClr val="bg1">
+                    <a:lumMod val="50000"/>
+                  </a:schemeClr>
+                </a:solidFill>
+              </a:rPr>
+              <a:t>[</a:t>
+            </a:r>
+            <a:r>
+              <a:rPr lang="en-US" sz="2200" dirty="0" err="1">
+                <a:solidFill>
+                  <a:schemeClr val="bg1">
+                    <a:lumMod val="50000"/>
+                  </a:schemeClr>
+                </a:solidFill>
+              </a:rPr>
+              <a:t>Golab</a:t>
+            </a:r>
+            <a:r>
+              <a:rPr lang="en-US" sz="2200" dirty="0">
+                <a:solidFill>
+                  <a:schemeClr val="bg1">
+                    <a:lumMod val="50000"/>
+                  </a:schemeClr>
+                </a:solidFill>
+              </a:rPr>
+              <a:t> et al. 2011] </a:t>
+            </a:r>
+            <a:endParaRPr lang="en-US" dirty="0"/>
+          </a:p>
+          <a:p>
+            <a:pPr marL="342900" indent="-342900" algn="l" rtl="0">
               <a:buFont typeface="+mj-lt"/>
               <a:buAutoNum type="arabicPeriod"/>
             </a:pPr>
             <a:endParaRPr lang="en-US" dirty="0"/>
           </a:p>
           <a:p>
-            <a:pPr marL="457200" indent="-457200">
+            <a:pPr marL="342900" indent="-342900" algn="l" rtl="0">
               <a:buFont typeface="+mj-lt"/>
               <a:buAutoNum type="arabicPeriod"/>
             </a:pPr>
@@ -10289,7 +9641,7 @@
 <file path=ppt/theme/theme1.xml><?xml version="1.0" encoding="utf-8"?>
 <a:theme xmlns:a="http://schemas.openxmlformats.org/drawingml/2006/main" name="Office Theme">
   <a:themeElements>
-    <a:clrScheme name="Office">
+    <a:clrScheme name="Office Theme">
       <a:dk1>
         <a:sysClr val="windowText" lastClr="000000"/>
       </a:dk1>
@@ -10303,7 +9655,7 @@
         <a:srgbClr val="E7E6E6"/>
       </a:lt2>
       <a:accent1>
-        <a:srgbClr val="4472C4"/>
+        <a:srgbClr val="5B9BD5"/>
       </a:accent1>
       <a:accent2>
         <a:srgbClr val="ED7D31"/>
@@ -10315,7 +9667,7 @@
         <a:srgbClr val="FFC000"/>
       </a:accent4>
       <a:accent5>
-        <a:srgbClr val="5B9BD5"/>
+        <a:srgbClr val="4472C4"/>
       </a:accent5>
       <a:accent6>
         <a:srgbClr val="70AD47"/>
@@ -10327,7 +9679,7 @@
         <a:srgbClr val="954F72"/>
       </a:folHlink>
     </a:clrScheme>
-    <a:fontScheme name="Office">
+    <a:fontScheme name="Office Theme">
       <a:majorFont>
         <a:latin typeface="Calibri Light" panose="020F0302020204030204"/>
         <a:ea typeface=""/>
@@ -10362,23 +9714,6 @@
         <a:font script="Viet" typeface="Times New Roman"/>
         <a:font script="Uigh" typeface="Microsoft Uighur"/>
         <a:font script="Geor" typeface="Sylfaen"/>
-        <a:font script="Armn" typeface="Arial"/>
-        <a:font script="Bugi" typeface="Leelawadee UI"/>
-        <a:font script="Bopo" typeface="Microsoft JhengHei"/>
-        <a:font script="Java" typeface="Javanese Text"/>
-        <a:font script="Lisu" typeface="Segoe UI"/>
-        <a:font script="Mymr" typeface="Myanmar Text"/>
-        <a:font script="Nkoo" typeface="Ebrima"/>
-        <a:font script="Olck" typeface="Nirmala UI"/>
-        <a:font script="Osma" typeface="Ebrima"/>
-        <a:font script="Phag" typeface="Phagspa"/>
-        <a:font script="Syrn" typeface="Estrangelo Edessa"/>
-        <a:font script="Syrj" typeface="Estrangelo Edessa"/>
-        <a:font script="Syre" typeface="Estrangelo Edessa"/>
-        <a:font script="Sora" typeface="Nirmala UI"/>
-        <a:font script="Tale" typeface="Microsoft Tai Le"/>
-        <a:font script="Talu" typeface="Microsoft New Tai Lue"/>
-        <a:font script="Tfng" typeface="Ebrima"/>
       </a:majorFont>
       <a:minorFont>
         <a:latin typeface="Calibri" panose="020F0502020204030204"/>
@@ -10414,26 +9749,9 @@
         <a:font script="Viet" typeface="Arial"/>
         <a:font script="Uigh" typeface="Microsoft Uighur"/>
         <a:font script="Geor" typeface="Sylfaen"/>
-        <a:font script="Armn" typeface="Arial"/>
-        <a:font script="Bugi" typeface="Leelawadee UI"/>
-        <a:font script="Bopo" typeface="Microsoft JhengHei"/>
-        <a:font script="Java" typeface="Javanese Text"/>
-        <a:font script="Lisu" typeface="Segoe UI"/>
-        <a:font script="Mymr" typeface="Myanmar Text"/>
-        <a:font script="Nkoo" typeface="Ebrima"/>
-        <a:font script="Olck" typeface="Nirmala UI"/>
-        <a:font script="Osma" typeface="Ebrima"/>
-        <a:font script="Phag" typeface="Phagspa"/>
-        <a:font script="Syrn" typeface="Estrangelo Edessa"/>
-        <a:font script="Syrj" typeface="Estrangelo Edessa"/>
-        <a:font script="Syre" typeface="Estrangelo Edessa"/>
-        <a:font script="Sora" typeface="Nirmala UI"/>
-        <a:font script="Tale" typeface="Microsoft Tai Le"/>
-        <a:font script="Talu" typeface="Microsoft New Tai Lue"/>
-        <a:font script="Tfng" typeface="Ebrima"/>
       </a:minorFont>
     </a:fontScheme>
-    <a:fmtScheme name="Office">
+    <a:fmtScheme name="Office Theme">
       <a:fillStyleLst>
         <a:solidFill>
           <a:schemeClr val="phClr"/>

</xml_diff>